<commit_message>
story and splash screens completed
</commit_message>
<xml_diff>
--- a/doc/StarPizzasPres.pptx
+++ b/doc/StarPizzasPres.pptx
@@ -278,7 +278,7 @@
           <a:p>
             <a:fld id="{B4218661-A57B-B242-BAAF-13970FA3A620}" type="datetimeFigureOut">
               <a:rPr lang="en-US" smtClean="0"/>
-              <a:t>1/25/21</a:t>
+              <a:t>1/27/21</a:t>
             </a:fld>
             <a:endParaRPr lang="en-US"/>
           </a:p>
@@ -476,7 +476,7 @@
           <a:p>
             <a:fld id="{B4218661-A57B-B242-BAAF-13970FA3A620}" type="datetimeFigureOut">
               <a:rPr lang="en-US" smtClean="0"/>
-              <a:t>1/25/21</a:t>
+              <a:t>1/27/21</a:t>
             </a:fld>
             <a:endParaRPr lang="en-US"/>
           </a:p>
@@ -684,7 +684,7 @@
           <a:p>
             <a:fld id="{B4218661-A57B-B242-BAAF-13970FA3A620}" type="datetimeFigureOut">
               <a:rPr lang="en-US" smtClean="0"/>
-              <a:t>1/25/21</a:t>
+              <a:t>1/27/21</a:t>
             </a:fld>
             <a:endParaRPr lang="en-US"/>
           </a:p>
@@ -882,7 +882,7 @@
           <a:p>
             <a:fld id="{B4218661-A57B-B242-BAAF-13970FA3A620}" type="datetimeFigureOut">
               <a:rPr lang="en-US" smtClean="0"/>
-              <a:t>1/25/21</a:t>
+              <a:t>1/27/21</a:t>
             </a:fld>
             <a:endParaRPr lang="en-US"/>
           </a:p>
@@ -1157,7 +1157,7 @@
           <a:p>
             <a:fld id="{B4218661-A57B-B242-BAAF-13970FA3A620}" type="datetimeFigureOut">
               <a:rPr lang="en-US" smtClean="0"/>
-              <a:t>1/25/21</a:t>
+              <a:t>1/27/21</a:t>
             </a:fld>
             <a:endParaRPr lang="en-US"/>
           </a:p>
@@ -1422,7 +1422,7 @@
           <a:p>
             <a:fld id="{B4218661-A57B-B242-BAAF-13970FA3A620}" type="datetimeFigureOut">
               <a:rPr lang="en-US" smtClean="0"/>
-              <a:t>1/25/21</a:t>
+              <a:t>1/27/21</a:t>
             </a:fld>
             <a:endParaRPr lang="en-US"/>
           </a:p>
@@ -1834,7 +1834,7 @@
           <a:p>
             <a:fld id="{B4218661-A57B-B242-BAAF-13970FA3A620}" type="datetimeFigureOut">
               <a:rPr lang="en-US" smtClean="0"/>
-              <a:t>1/25/21</a:t>
+              <a:t>1/27/21</a:t>
             </a:fld>
             <a:endParaRPr lang="en-US"/>
           </a:p>
@@ -1975,7 +1975,7 @@
           <a:p>
             <a:fld id="{B4218661-A57B-B242-BAAF-13970FA3A620}" type="datetimeFigureOut">
               <a:rPr lang="en-US" smtClean="0"/>
-              <a:t>1/25/21</a:t>
+              <a:t>1/27/21</a:t>
             </a:fld>
             <a:endParaRPr lang="en-US"/>
           </a:p>
@@ -2088,7 +2088,7 @@
           <a:p>
             <a:fld id="{B4218661-A57B-B242-BAAF-13970FA3A620}" type="datetimeFigureOut">
               <a:rPr lang="en-US" smtClean="0"/>
-              <a:t>1/25/21</a:t>
+              <a:t>1/27/21</a:t>
             </a:fld>
             <a:endParaRPr lang="en-US"/>
           </a:p>
@@ -2399,7 +2399,7 @@
           <a:p>
             <a:fld id="{B4218661-A57B-B242-BAAF-13970FA3A620}" type="datetimeFigureOut">
               <a:rPr lang="en-US" smtClean="0"/>
-              <a:t>1/25/21</a:t>
+              <a:t>1/27/21</a:t>
             </a:fld>
             <a:endParaRPr lang="en-US"/>
           </a:p>
@@ -2687,7 +2687,7 @@
           <a:p>
             <a:fld id="{B4218661-A57B-B242-BAAF-13970FA3A620}" type="datetimeFigureOut">
               <a:rPr lang="en-US" smtClean="0"/>
-              <a:t>1/25/21</a:t>
+              <a:t>1/27/21</a:t>
             </a:fld>
             <a:endParaRPr lang="en-US"/>
           </a:p>
@@ -2928,7 +2928,7 @@
           <a:p>
             <a:fld id="{B4218661-A57B-B242-BAAF-13970FA3A620}" type="datetimeFigureOut">
               <a:rPr lang="en-US" smtClean="0"/>
-              <a:t>1/25/21</a:t>
+              <a:t>1/27/21</a:t>
             </a:fld>
             <a:endParaRPr lang="en-US"/>
           </a:p>
@@ -4192,76 +4192,63 @@
           </a:extLst>
         </p:spPr>
       </p:pic>
-      <p:sp>
-        <p:nvSpPr>
-          <p:cNvPr id="4" name="Rectangle 3">
-            <a:extLst>
-              <a:ext uri="{FF2B5EF4-FFF2-40B4-BE49-F238E27FC236}">
-                <a16:creationId xmlns:a16="http://schemas.microsoft.com/office/drawing/2014/main" id="{BE9E571B-CA99-E843-8319-F58F3A764E46}"/>
-              </a:ext>
-            </a:extLst>
-          </p:cNvPr>
-          <p:cNvSpPr/>
+      <p:cxnSp>
+        <p:nvCxnSpPr>
+          <p:cNvPr id="29" name="Straight Connector 28">
+            <a:extLst>
+              <a:ext uri="{FF2B5EF4-FFF2-40B4-BE49-F238E27FC236}">
+                <a16:creationId xmlns:a16="http://schemas.microsoft.com/office/drawing/2014/main" id="{DB208D06-CCCC-7443-8C4E-9474A09B5624}"/>
+              </a:ext>
+            </a:extLst>
+          </p:cNvPr>
+          <p:cNvCxnSpPr>
+            <a:cxnSpLocks/>
+          </p:cNvCxnSpPr>
           <p:nvPr/>
-        </p:nvSpPr>
+        </p:nvCxnSpPr>
         <p:spPr>
           <a:xfrm>
-            <a:off x="115613" y="5010451"/>
-            <a:ext cx="3244885" cy="1200329"/>
-          </a:xfrm>
-          <a:prstGeom prst="rect">
+            <a:off x="10972800" y="0"/>
+            <a:ext cx="0" cy="6858000"/>
+          </a:xfrm>
+          <a:prstGeom prst="line">
             <a:avLst/>
           </a:prstGeom>
-        </p:spPr>
-        <p:txBody>
-          <a:bodyPr wrap="square">
-            <a:spAutoFit/>
-          </a:bodyPr>
-          <a:lstStyle/>
-          <a:p>
-            <a:r>
-              <a:rPr lang="en-US" b="1" dirty="0"/>
-              <a:t>Pizza Star Ship Ops</a:t>
-            </a:r>
-          </a:p>
-          <a:p>
-            <a:r>
-              <a:rPr lang="en-US" b="1" dirty="0"/>
-              <a:t>&lt;-  -&gt;               </a:t>
-            </a:r>
-            <a:r>
-              <a:rPr lang="en-US" dirty="0"/>
-              <a:t>point</a:t>
-            </a:r>
-          </a:p>
-          <a:p>
-            <a:r>
-              <a:rPr lang="en-US" b="1" dirty="0"/>
-              <a:t>f </a:t>
-            </a:r>
-            <a:r>
-              <a:rPr lang="en-US" dirty="0"/>
-              <a:t>                      shoot </a:t>
-            </a:r>
-          </a:p>
-          <a:p>
-            <a:r>
-              <a:rPr lang="en-US" b="1" dirty="0"/>
-              <a:t>^                      </a:t>
-            </a:r>
-            <a:r>
-              <a:rPr lang="en-US" dirty="0"/>
-              <a:t>boost   </a:t>
-            </a:r>
-          </a:p>
-        </p:txBody>
-      </p:sp>
+          <a:ln w="38100">
+            <a:solidFill>
+              <a:srgbClr val="FF0000"/>
+            </a:solidFill>
+          </a:ln>
+          <a:effectLst>
+            <a:glow rad="101600">
+              <a:schemeClr val="accent2">
+                <a:satMod val="175000"/>
+                <a:alpha val="40000"/>
+              </a:schemeClr>
+            </a:glow>
+          </a:effectLst>
+        </p:spPr>
+        <p:style>
+          <a:lnRef idx="1">
+            <a:schemeClr val="accent1"/>
+          </a:lnRef>
+          <a:fillRef idx="0">
+            <a:schemeClr val="accent1"/>
+          </a:fillRef>
+          <a:effectRef idx="0">
+            <a:schemeClr val="accent1"/>
+          </a:effectRef>
+          <a:fontRef idx="minor">
+            <a:schemeClr val="tx1"/>
+          </a:fontRef>
+        </p:style>
+      </p:cxnSp>
       <p:grpSp>
         <p:nvGrpSpPr>
-          <p:cNvPr id="27" name="Group 26">
-            <a:extLst>
-              <a:ext uri="{FF2B5EF4-FFF2-40B4-BE49-F238E27FC236}">
-                <a16:creationId xmlns:a16="http://schemas.microsoft.com/office/drawing/2014/main" id="{4FE03931-CBA5-1F42-B78D-7C11D4C31654}"/>
+          <p:cNvPr id="37" name="Group 36">
+            <a:extLst>
+              <a:ext uri="{FF2B5EF4-FFF2-40B4-BE49-F238E27FC236}">
+                <a16:creationId xmlns:a16="http://schemas.microsoft.com/office/drawing/2014/main" id="{48C736B8-07F3-D847-86FF-67700E5EFF07}"/>
               </a:ext>
             </a:extLst>
           </p:cNvPr>
@@ -4270,7 +4257,7 @@
         </p:nvGrpSpPr>
         <p:grpSpPr>
           <a:xfrm>
-            <a:off x="3360498" y="1045445"/>
+            <a:off x="3270003" y="1143000"/>
             <a:ext cx="5772366" cy="5446310"/>
             <a:chOff x="3061740" y="1092325"/>
             <a:chExt cx="5772366" cy="5446310"/>
@@ -4278,10 +4265,10 @@
         </p:grpSpPr>
         <p:pic>
           <p:nvPicPr>
-            <p:cNvPr id="1026" name="Picture 2" descr="Post It Notes Clipart | Clipart Panda - Free Clipart Images">
+            <p:cNvPr id="38" name="Picture 2" descr="Post It Notes Clipart | Clipart Panda - Free Clipart Images">
               <a:extLst>
                 <a:ext uri="{FF2B5EF4-FFF2-40B4-BE49-F238E27FC236}">
-                  <a16:creationId xmlns:a16="http://schemas.microsoft.com/office/drawing/2014/main" id="{792B61A2-231F-8F42-ACED-55D2CE25DA6D}"/>
+                  <a16:creationId xmlns:a16="http://schemas.microsoft.com/office/drawing/2014/main" id="{195DFD40-7730-B546-A7CC-4BE9ACD2F3ED}"/>
                 </a:ext>
               </a:extLst>
             </p:cNvPr>
@@ -4335,10 +4322,10 @@
         </p:pic>
         <p:sp>
           <p:nvSpPr>
-            <p:cNvPr id="20" name="TextBox 19">
+            <p:cNvPr id="39" name="TextBox 38">
               <a:extLst>
                 <a:ext uri="{FF2B5EF4-FFF2-40B4-BE49-F238E27FC236}">
-                  <a16:creationId xmlns:a16="http://schemas.microsoft.com/office/drawing/2014/main" id="{03CD1E6F-6803-2F4F-BBEF-AB8C079CAC80}"/>
+                  <a16:creationId xmlns:a16="http://schemas.microsoft.com/office/drawing/2014/main" id="{1AC19796-82E5-C746-854C-4EF090299B4D}"/>
                 </a:ext>
               </a:extLst>
             </p:cNvPr>
@@ -4347,7 +4334,7 @@
           </p:nvSpPr>
           <p:spPr>
             <a:xfrm rot="257984">
-              <a:off x="3922666" y="4320611"/>
+              <a:off x="3922666" y="3962805"/>
               <a:ext cx="1694318" cy="646331"/>
             </a:xfrm>
             <a:prstGeom prst="rect">
@@ -4363,7 +4350,7 @@
             <a:p>
               <a:r>
                 <a:rPr lang="en-US" sz="3600" b="1" dirty="0"/>
-                <a:t>Avoid</a:t>
+                <a:t>avoid:</a:t>
               </a:r>
               <a:endParaRPr lang="en-US" sz="3600" dirty="0"/>
             </a:p>
@@ -4371,10 +4358,10 @@
         </p:sp>
         <p:pic>
           <p:nvPicPr>
-            <p:cNvPr id="19" name="Picture 4" descr="Tomato - Free food icons">
+            <p:cNvPr id="40" name="Picture 4" descr="Tomato - Free food icons">
               <a:extLst>
                 <a:ext uri="{FF2B5EF4-FFF2-40B4-BE49-F238E27FC236}">
-                  <a16:creationId xmlns:a16="http://schemas.microsoft.com/office/drawing/2014/main" id="{39D322DA-2073-A54D-96B4-6B0084B57B41}"/>
+                  <a16:creationId xmlns:a16="http://schemas.microsoft.com/office/drawing/2014/main" id="{E1A6FBE7-91E0-5A4D-98EA-0108923037B6}"/>
                 </a:ext>
               </a:extLst>
             </p:cNvPr>
@@ -4418,10 +4405,10 @@
         </p:pic>
         <p:pic>
           <p:nvPicPr>
-            <p:cNvPr id="25" name="Picture 14" descr="Herb Basil Icon | 3D Food Iconset | Icons-Land">
+            <p:cNvPr id="41" name="Picture 14" descr="Herb Basil Icon | 3D Food Iconset | Icons-Land">
               <a:extLst>
                 <a:ext uri="{FF2B5EF4-FFF2-40B4-BE49-F238E27FC236}">
-                  <a16:creationId xmlns:a16="http://schemas.microsoft.com/office/drawing/2014/main" id="{13E676E2-9771-C840-BCD0-AF0D10990EDF}"/>
+                  <a16:creationId xmlns:a16="http://schemas.microsoft.com/office/drawing/2014/main" id="{B4645952-16C9-3B4A-84EE-245F781B31AE}"/>
                 </a:ext>
               </a:extLst>
             </p:cNvPr>
@@ -4465,10 +4452,10 @@
         </p:pic>
         <p:pic>
           <p:nvPicPr>
-            <p:cNvPr id="26" name="Picture 8" descr="Music festival Icon, Singing golden decoration, poster, summer, fruit png |  PNGWing">
+            <p:cNvPr id="42" name="Picture 8" descr="Music festival Icon, Singing golden decoration, poster, summer, fruit png |  PNGWing">
               <a:extLst>
                 <a:ext uri="{FF2B5EF4-FFF2-40B4-BE49-F238E27FC236}">
-                  <a16:creationId xmlns:a16="http://schemas.microsoft.com/office/drawing/2014/main" id="{F753AAB2-B00C-FA4A-9CBE-5D389AA7C34B}"/>
+                  <a16:creationId xmlns:a16="http://schemas.microsoft.com/office/drawing/2014/main" id="{D90CBEFE-E9EB-C944-BF2F-58BA767F7111}"/>
                 </a:ext>
               </a:extLst>
             </p:cNvPr>
@@ -4501,7 +4488,7 @@
           </p:blipFill>
           <p:spPr bwMode="auto">
             <a:xfrm>
-              <a:off x="5337257" y="4145925"/>
+              <a:off x="5337257" y="3788119"/>
               <a:ext cx="778019" cy="989140"/>
             </a:xfrm>
             <a:prstGeom prst="rect">
@@ -4521,10 +4508,10 @@
         </p:pic>
         <p:sp>
           <p:nvSpPr>
-            <p:cNvPr id="6" name="Rectangle 5">
+            <p:cNvPr id="43" name="Rectangle 42">
               <a:extLst>
                 <a:ext uri="{FF2B5EF4-FFF2-40B4-BE49-F238E27FC236}">
-                  <a16:creationId xmlns:a16="http://schemas.microsoft.com/office/drawing/2014/main" id="{C26D4D3B-F130-8C4A-8003-8064DB6AE6C4}"/>
+                  <a16:creationId xmlns:a16="http://schemas.microsoft.com/office/drawing/2014/main" id="{A8B7C20A-FA15-914A-AB78-E64F07DDC5A0}"/>
                 </a:ext>
               </a:extLst>
             </p:cNvPr>
@@ -4565,10 +4552,10 @@
         </p:sp>
         <p:sp>
           <p:nvSpPr>
-            <p:cNvPr id="7" name="Rectangle 6">
+            <p:cNvPr id="44" name="Rectangle 43">
               <a:extLst>
                 <a:ext uri="{FF2B5EF4-FFF2-40B4-BE49-F238E27FC236}">
-                  <a16:creationId xmlns:a16="http://schemas.microsoft.com/office/drawing/2014/main" id="{BF0B8E50-89A6-1849-AFF3-9BBE9893B232}"/>
+                  <a16:creationId xmlns:a16="http://schemas.microsoft.com/office/drawing/2014/main" id="{C416FC56-2871-A947-A5FA-3B7DE31F629F}"/>
                 </a:ext>
               </a:extLst>
             </p:cNvPr>
@@ -4597,17 +4584,17 @@
                     <a:prstClr val="black"/>
                   </a:solidFill>
                 </a:rPr>
-                <a:t>Get</a:t>
+                <a:t>get:</a:t>
               </a:r>
             </a:p>
           </p:txBody>
         </p:sp>
         <p:pic>
           <p:nvPicPr>
-            <p:cNvPr id="18" name="Picture 17" descr="A white circle on a black background&#10;&#10;Description automatically generated with medium confidence">
+            <p:cNvPr id="45" name="Picture 44" descr="A white circle on a black background&#10;&#10;Description automatically generated with medium confidence">
               <a:extLst>
                 <a:ext uri="{FF2B5EF4-FFF2-40B4-BE49-F238E27FC236}">
-                  <a16:creationId xmlns:a16="http://schemas.microsoft.com/office/drawing/2014/main" id="{95BBD1B9-C256-F44D-9983-F14F7EA91E43}"/>
+                  <a16:creationId xmlns:a16="http://schemas.microsoft.com/office/drawing/2014/main" id="{6E0DAFC8-BEBC-DC45-82B8-67DB8CEF749B}"/>
                 </a:ext>
               </a:extLst>
             </p:cNvPr>
@@ -4633,57 +4620,122 @@
           </p:spPr>
         </p:pic>
       </p:grpSp>
-      <p:cxnSp>
-        <p:nvCxnSpPr>
-          <p:cNvPr id="29" name="Straight Connector 28">
-            <a:extLst>
-              <a:ext uri="{FF2B5EF4-FFF2-40B4-BE49-F238E27FC236}">
-                <a16:creationId xmlns:a16="http://schemas.microsoft.com/office/drawing/2014/main" id="{DB208D06-CCCC-7443-8C4E-9474A09B5624}"/>
-              </a:ext>
-            </a:extLst>
-          </p:cNvPr>
-          <p:cNvCxnSpPr>
-            <a:cxnSpLocks/>
-          </p:cNvCxnSpPr>
+      <p:sp>
+        <p:nvSpPr>
+          <p:cNvPr id="46" name="TextBox 45">
+            <a:extLst>
+              <a:ext uri="{FF2B5EF4-FFF2-40B4-BE49-F238E27FC236}">
+                <a16:creationId xmlns:a16="http://schemas.microsoft.com/office/drawing/2014/main" id="{CF0EDDC8-EFAA-6849-8123-3D2F9115972E}"/>
+              </a:ext>
+            </a:extLst>
+          </p:cNvPr>
+          <p:cNvSpPr txBox="1"/>
           <p:nvPr/>
-        </p:nvCxnSpPr>
+        </p:nvSpPr>
         <p:spPr>
-          <a:xfrm>
-            <a:off x="10972800" y="0"/>
-            <a:ext cx="0" cy="6858000"/>
-          </a:xfrm>
-          <a:prstGeom prst="line">
+          <a:xfrm rot="257984">
+            <a:off x="3794200" y="4869037"/>
+            <a:ext cx="1473212" cy="646331"/>
+          </a:xfrm>
+          <a:prstGeom prst="rect">
             <a:avLst/>
           </a:prstGeom>
-          <a:ln w="38100">
-            <a:solidFill>
-              <a:srgbClr val="FF0000"/>
-            </a:solidFill>
-          </a:ln>
-          <a:effectLst>
-            <a:glow rad="101600">
-              <a:schemeClr val="accent2">
-                <a:satMod val="175000"/>
-                <a:alpha val="40000"/>
-              </a:schemeClr>
-            </a:glow>
-          </a:effectLst>
-        </p:spPr>
-        <p:style>
-          <a:lnRef idx="1">
-            <a:schemeClr val="accent1"/>
-          </a:lnRef>
-          <a:fillRef idx="0">
-            <a:schemeClr val="accent1"/>
-          </a:fillRef>
-          <a:effectRef idx="0">
-            <a:schemeClr val="accent1"/>
-          </a:effectRef>
-          <a:fontRef idx="minor">
-            <a:schemeClr val="tx1"/>
-          </a:fontRef>
-        </p:style>
-      </p:cxnSp>
+          <a:noFill/>
+        </p:spPr>
+        <p:txBody>
+          <a:bodyPr wrap="square" rtlCol="0">
+            <a:spAutoFit/>
+          </a:bodyPr>
+          <a:lstStyle/>
+          <a:p>
+            <a:pPr algn="r"/>
+            <a:r>
+              <a:rPr lang="en-US" sz="3600" b="1" dirty="0"/>
+              <a:t>move:</a:t>
+            </a:r>
+            <a:endParaRPr lang="en-US" sz="3600" dirty="0"/>
+          </a:p>
+        </p:txBody>
+      </p:sp>
+      <p:pic>
+        <p:nvPicPr>
+          <p:cNvPr id="47" name="Picture 46">
+            <a:extLst>
+              <a:ext uri="{FF2B5EF4-FFF2-40B4-BE49-F238E27FC236}">
+                <a16:creationId xmlns:a16="http://schemas.microsoft.com/office/drawing/2014/main" id="{B4E9093E-0119-E54A-9EB6-DE78D56585BC}"/>
+              </a:ext>
+            </a:extLst>
+          </p:cNvPr>
+          <p:cNvPicPr>
+            <a:picLocks noChangeAspect="1"/>
+          </p:cNvPicPr>
+          <p:nvPr/>
+        </p:nvPicPr>
+        <p:blipFill>
+          <a:blip r:embed="rId12"/>
+          <a:stretch>
+            <a:fillRect/>
+          </a:stretch>
+        </p:blipFill>
+        <p:spPr>
+          <a:xfrm rot="247761">
+            <a:off x="5404640" y="5162120"/>
+            <a:ext cx="444500" cy="292100"/>
+          </a:xfrm>
+          <a:prstGeom prst="rect">
+            <a:avLst/>
+          </a:prstGeom>
+        </p:spPr>
+      </p:pic>
+      <p:sp>
+        <p:nvSpPr>
+          <p:cNvPr id="48" name="TextBox 47">
+            <a:extLst>
+              <a:ext uri="{FF2B5EF4-FFF2-40B4-BE49-F238E27FC236}">
+                <a16:creationId xmlns:a16="http://schemas.microsoft.com/office/drawing/2014/main" id="{FA4E1CC5-3E41-314F-B176-9014335DB1DF}"/>
+              </a:ext>
+            </a:extLst>
+          </p:cNvPr>
+          <p:cNvSpPr txBox="1"/>
+          <p:nvPr/>
+        </p:nvSpPr>
+        <p:spPr>
+          <a:xfrm rot="257984">
+            <a:off x="6104923" y="5052471"/>
+            <a:ext cx="1311347" cy="646331"/>
+          </a:xfrm>
+          <a:prstGeom prst="rect">
+            <a:avLst/>
+          </a:prstGeom>
+          <a:noFill/>
+        </p:spPr>
+        <p:txBody>
+          <a:bodyPr wrap="square" rtlCol="0">
+            <a:spAutoFit/>
+          </a:bodyPr>
+          <a:lstStyle/>
+          <a:p>
+            <a:pPr algn="r"/>
+            <a:r>
+              <a:rPr lang="en-US" sz="3600" b="1" dirty="0"/>
+              <a:t>fire:  </a:t>
+            </a:r>
+            <a:r>
+              <a:rPr lang="en-US" sz="3600" b="1" dirty="0">
+                <a:solidFill>
+                  <a:srgbClr val="FF0000"/>
+                </a:solidFill>
+              </a:rPr>
+              <a:t>f</a:t>
+            </a:r>
+            <a:endParaRPr lang="en-US" sz="3600" dirty="0">
+              <a:solidFill>
+                <a:srgbClr val="FF0000"/>
+              </a:solidFill>
+            </a:endParaRPr>
+          </a:p>
+        </p:txBody>
+      </p:sp>
     </p:spTree>
     <p:extLst>
       <p:ext uri="{BB962C8B-B14F-4D97-AF65-F5344CB8AC3E}">

</xml_diff>

<commit_message>
fixed images link for gh-pages
</commit_message>
<xml_diff>
--- a/doc/StarPizzasPres.pptx
+++ b/doc/StarPizzasPres.pptx
@@ -9,6 +9,10 @@
     <p:sldId id="258" r:id="rId3"/>
     <p:sldId id="262" r:id="rId4"/>
     <p:sldId id="263" r:id="rId5"/>
+    <p:sldId id="266" r:id="rId6"/>
+    <p:sldId id="267" r:id="rId7"/>
+    <p:sldId id="268" r:id="rId8"/>
+    <p:sldId id="269" r:id="rId9"/>
   </p:sldIdLst>
   <p:sldSz cx="12192000" cy="6858000"/>
   <p:notesSz cx="6858000" cy="9144000"/>
@@ -6122,6 +6126,1893 @@
 </p:sld>
 </file>
 
+<file path=ppt/slides/slide5.xml><?xml version="1.0" encoding="utf-8"?>
+<p:sld xmlns:a="http://schemas.openxmlformats.org/drawingml/2006/main" xmlns:r="http://schemas.openxmlformats.org/officeDocument/2006/relationships" xmlns:p="http://schemas.openxmlformats.org/presentationml/2006/main">
+  <p:cSld>
+    <p:spTree>
+      <p:nvGrpSpPr>
+        <p:cNvPr id="1" name=""/>
+        <p:cNvGrpSpPr/>
+        <p:nvPr/>
+      </p:nvGrpSpPr>
+      <p:grpSpPr>
+        <a:xfrm>
+          <a:off x="0" y="0"/>
+          <a:ext cx="0" cy="0"/>
+          <a:chOff x="0" y="0"/>
+          <a:chExt cx="0" cy="0"/>
+        </a:xfrm>
+      </p:grpSpPr>
+      <p:sp>
+        <p:nvSpPr>
+          <p:cNvPr id="11" name="TextBox 10">
+            <a:extLst>
+              <a:ext uri="{FF2B5EF4-FFF2-40B4-BE49-F238E27FC236}">
+                <a16:creationId xmlns:a16="http://schemas.microsoft.com/office/drawing/2014/main" id="{599CFB6F-1CDC-1E47-AD65-3A93F91E4C34}"/>
+              </a:ext>
+            </a:extLst>
+          </p:cNvPr>
+          <p:cNvSpPr txBox="1"/>
+          <p:nvPr/>
+        </p:nvSpPr>
+        <p:spPr>
+          <a:xfrm>
+            <a:off x="9653588" y="-615130"/>
+            <a:ext cx="45719" cy="45719"/>
+          </a:xfrm>
+          <a:prstGeom prst="rect">
+            <a:avLst/>
+          </a:prstGeom>
+          <a:noFill/>
+        </p:spPr>
+        <p:txBody>
+          <a:bodyPr wrap="square" rtlCol="0">
+            <a:spAutoFit/>
+          </a:bodyPr>
+          <a:lstStyle/>
+          <a:p>
+            <a:endParaRPr lang="en-US" dirty="0"/>
+          </a:p>
+        </p:txBody>
+      </p:sp>
+      <p:sp>
+        <p:nvSpPr>
+          <p:cNvPr id="13" name="TextBox 12">
+            <a:extLst>
+              <a:ext uri="{FF2B5EF4-FFF2-40B4-BE49-F238E27FC236}">
+                <a16:creationId xmlns:a16="http://schemas.microsoft.com/office/drawing/2014/main" id="{4C9F4712-0465-5142-8957-D4FE29B6C012}"/>
+              </a:ext>
+            </a:extLst>
+          </p:cNvPr>
+          <p:cNvSpPr txBox="1"/>
+          <p:nvPr/>
+        </p:nvSpPr>
+        <p:spPr>
+          <a:xfrm>
+            <a:off x="15687675" y="-1323155"/>
+            <a:ext cx="45719" cy="45719"/>
+          </a:xfrm>
+          <a:prstGeom prst="rect">
+            <a:avLst/>
+          </a:prstGeom>
+          <a:noFill/>
+        </p:spPr>
+        <p:txBody>
+          <a:bodyPr wrap="square" rtlCol="0">
+            <a:spAutoFit/>
+          </a:bodyPr>
+          <a:lstStyle/>
+          <a:p>
+            <a:endParaRPr lang="en-US" dirty="0"/>
+          </a:p>
+        </p:txBody>
+      </p:sp>
+      <p:sp>
+        <p:nvSpPr>
+          <p:cNvPr id="3" name="Rectangle 2">
+            <a:extLst>
+              <a:ext uri="{FF2B5EF4-FFF2-40B4-BE49-F238E27FC236}">
+                <a16:creationId xmlns:a16="http://schemas.microsoft.com/office/drawing/2014/main" id="{53A3E218-A5EC-7E4C-B83C-C8EE7042C7E2}"/>
+              </a:ext>
+            </a:extLst>
+          </p:cNvPr>
+          <p:cNvSpPr/>
+          <p:nvPr/>
+        </p:nvSpPr>
+        <p:spPr>
+          <a:xfrm>
+            <a:off x="5501748" y="366245"/>
+            <a:ext cx="1284455" cy="461665"/>
+          </a:xfrm>
+          <a:prstGeom prst="rect">
+            <a:avLst/>
+          </a:prstGeom>
+        </p:spPr>
+        <p:txBody>
+          <a:bodyPr wrap="none">
+            <a:spAutoFit/>
+          </a:bodyPr>
+          <a:lstStyle/>
+          <a:p>
+            <a:pPr algn="ctr"/>
+            <a:r>
+              <a:rPr lang="en-US" sz="2400" b="1" i="1" dirty="0"/>
+              <a:t>Features</a:t>
+            </a:r>
+          </a:p>
+        </p:txBody>
+      </p:sp>
+      <p:pic>
+        <p:nvPicPr>
+          <p:cNvPr id="12" name="Picture 11">
+            <a:extLst>
+              <a:ext uri="{FF2B5EF4-FFF2-40B4-BE49-F238E27FC236}">
+                <a16:creationId xmlns:a16="http://schemas.microsoft.com/office/drawing/2014/main" id="{B37B57D4-DB61-9C4D-BDD7-4DEA862BF367}"/>
+              </a:ext>
+            </a:extLst>
+          </p:cNvPr>
+          <p:cNvPicPr>
+            <a:picLocks noChangeAspect="1"/>
+          </p:cNvPicPr>
+          <p:nvPr/>
+        </p:nvPicPr>
+        <p:blipFill>
+          <a:blip r:embed="rId2"/>
+          <a:stretch>
+            <a:fillRect/>
+          </a:stretch>
+        </p:blipFill>
+        <p:spPr>
+          <a:xfrm>
+            <a:off x="10972800" y="5010451"/>
+            <a:ext cx="1281365" cy="1674767"/>
+          </a:xfrm>
+          <a:prstGeom prst="rect">
+            <a:avLst/>
+          </a:prstGeom>
+        </p:spPr>
+      </p:pic>
+      <p:pic>
+        <p:nvPicPr>
+          <p:cNvPr id="14" name="Picture 8" descr="Music festival Icon, Singing golden decoration, poster, summer, fruit png |  PNGWing">
+            <a:extLst>
+              <a:ext uri="{FF2B5EF4-FFF2-40B4-BE49-F238E27FC236}">
+                <a16:creationId xmlns:a16="http://schemas.microsoft.com/office/drawing/2014/main" id="{B53078FF-FA5B-D54E-8CC0-E2C71AD2CAA7}"/>
+              </a:ext>
+            </a:extLst>
+          </p:cNvPr>
+          <p:cNvPicPr>
+            <a:picLocks noChangeAspect="1" noChangeArrowheads="1"/>
+          </p:cNvPicPr>
+          <p:nvPr/>
+        </p:nvPicPr>
+        <p:blipFill>
+          <a:blip r:embed="rId3">
+            <a:extLst>
+              <a:ext uri="{BEBA8EAE-BF5A-486C-A8C5-ECC9F3942E4B}">
+                <a14:imgProps xmlns:a14="http://schemas.microsoft.com/office/drawing/2010/main">
+                  <a14:imgLayer r:embed="rId4">
+                    <a14:imgEffect>
+                      <a14:backgroundRemoval t="10000" b="90000" l="10000" r="90000"/>
+                    </a14:imgEffect>
+                  </a14:imgLayer>
+                </a14:imgProps>
+              </a:ext>
+              <a:ext uri="{28A0092B-C50C-407E-A947-70E740481C1C}">
+                <a14:useLocalDpi xmlns:a14="http://schemas.microsoft.com/office/drawing/2010/main" val="0"/>
+              </a:ext>
+            </a:extLst>
+          </a:blip>
+          <a:srcRect/>
+          <a:stretch>
+            <a:fillRect/>
+          </a:stretch>
+        </p:blipFill>
+        <p:spPr bwMode="auto">
+          <a:xfrm>
+            <a:off x="11081081" y="182998"/>
+            <a:ext cx="891263" cy="1133113"/>
+          </a:xfrm>
+          <a:prstGeom prst="rect">
+            <a:avLst/>
+          </a:prstGeom>
+          <a:noFill/>
+          <a:extLst>
+            <a:ext uri="{909E8E84-426E-40DD-AFC4-6F175D3DCCD1}">
+              <a14:hiddenFill xmlns:a14="http://schemas.microsoft.com/office/drawing/2010/main">
+                <a:solidFill>
+                  <a:srgbClr val="FFFFFF"/>
+                </a:solidFill>
+              </a14:hiddenFill>
+            </a:ext>
+          </a:extLst>
+        </p:spPr>
+      </p:pic>
+      <p:pic>
+        <p:nvPicPr>
+          <p:cNvPr id="15" name="Picture 4" descr="Tomato - Free food icons">
+            <a:extLst>
+              <a:ext uri="{FF2B5EF4-FFF2-40B4-BE49-F238E27FC236}">
+                <a16:creationId xmlns:a16="http://schemas.microsoft.com/office/drawing/2014/main" id="{00D1D9D5-244A-9D45-82B9-F8300EBA7A10}"/>
+              </a:ext>
+            </a:extLst>
+          </p:cNvPr>
+          <p:cNvPicPr>
+            <a:picLocks noChangeAspect="1" noChangeArrowheads="1"/>
+          </p:cNvPicPr>
+          <p:nvPr/>
+        </p:nvPicPr>
+        <p:blipFill>
+          <a:blip r:embed="rId5">
+            <a:extLst>
+              <a:ext uri="{28A0092B-C50C-407E-A947-70E740481C1C}">
+                <a14:useLocalDpi xmlns:a14="http://schemas.microsoft.com/office/drawing/2010/main" val="0"/>
+              </a:ext>
+            </a:extLst>
+          </a:blip>
+          <a:srcRect/>
+          <a:stretch>
+            <a:fillRect/>
+          </a:stretch>
+        </p:blipFill>
+        <p:spPr bwMode="auto">
+          <a:xfrm>
+            <a:off x="11300737" y="2933700"/>
+            <a:ext cx="671607" cy="671607"/>
+          </a:xfrm>
+          <a:prstGeom prst="rect">
+            <a:avLst/>
+          </a:prstGeom>
+          <a:noFill/>
+          <a:extLst>
+            <a:ext uri="{909E8E84-426E-40DD-AFC4-6F175D3DCCD1}">
+              <a14:hiddenFill xmlns:a14="http://schemas.microsoft.com/office/drawing/2010/main">
+                <a:solidFill>
+                  <a:srgbClr val="FFFFFF"/>
+                </a:solidFill>
+              </a14:hiddenFill>
+            </a:ext>
+          </a:extLst>
+        </p:spPr>
+      </p:pic>
+      <p:pic>
+        <p:nvPicPr>
+          <p:cNvPr id="16" name="Picture 6" descr="Mozzarella Di Bufala Icon On Transparent Background Stock Illustration -  Download Image Now - iStock">
+            <a:extLst>
+              <a:ext uri="{FF2B5EF4-FFF2-40B4-BE49-F238E27FC236}">
+                <a16:creationId xmlns:a16="http://schemas.microsoft.com/office/drawing/2014/main" id="{76BCD4CB-0035-1741-B2F8-600B920F880D}"/>
+              </a:ext>
+            </a:extLst>
+          </p:cNvPr>
+          <p:cNvPicPr>
+            <a:picLocks noChangeAspect="1" noChangeArrowheads="1"/>
+          </p:cNvPicPr>
+          <p:nvPr/>
+        </p:nvPicPr>
+        <p:blipFill>
+          <a:blip r:embed="rId6">
+            <a:extLst>
+              <a:ext uri="{28A0092B-C50C-407E-A947-70E740481C1C}">
+                <a14:useLocalDpi xmlns:a14="http://schemas.microsoft.com/office/drawing/2010/main" val="0"/>
+              </a:ext>
+            </a:extLst>
+          </a:blip>
+          <a:srcRect/>
+          <a:stretch>
+            <a:fillRect/>
+          </a:stretch>
+        </p:blipFill>
+        <p:spPr bwMode="auto">
+          <a:xfrm>
+            <a:off x="11275290" y="1789102"/>
+            <a:ext cx="671607" cy="671607"/>
+          </a:xfrm>
+          <a:prstGeom prst="rect">
+            <a:avLst/>
+          </a:prstGeom>
+          <a:noFill/>
+          <a:extLst>
+            <a:ext uri="{909E8E84-426E-40DD-AFC4-6F175D3DCCD1}">
+              <a14:hiddenFill xmlns:a14="http://schemas.microsoft.com/office/drawing/2010/main">
+                <a:solidFill>
+                  <a:srgbClr val="FFFFFF"/>
+                </a:solidFill>
+              </a14:hiddenFill>
+            </a:ext>
+          </a:extLst>
+        </p:spPr>
+      </p:pic>
+      <p:pic>
+        <p:nvPicPr>
+          <p:cNvPr id="17" name="Picture 14" descr="Herb Basil Icon | 3D Food Iconset | Icons-Land">
+            <a:extLst>
+              <a:ext uri="{FF2B5EF4-FFF2-40B4-BE49-F238E27FC236}">
+                <a16:creationId xmlns:a16="http://schemas.microsoft.com/office/drawing/2014/main" id="{69237BBB-ACD5-1846-8DE7-52288CD945C2}"/>
+              </a:ext>
+            </a:extLst>
+          </p:cNvPr>
+          <p:cNvPicPr>
+            <a:picLocks noChangeAspect="1" noChangeArrowheads="1"/>
+          </p:cNvPicPr>
+          <p:nvPr/>
+        </p:nvPicPr>
+        <p:blipFill>
+          <a:blip r:embed="rId7">
+            <a:extLst>
+              <a:ext uri="{28A0092B-C50C-407E-A947-70E740481C1C}">
+                <a14:useLocalDpi xmlns:a14="http://schemas.microsoft.com/office/drawing/2010/main" val="0"/>
+              </a:ext>
+            </a:extLst>
+          </a:blip>
+          <a:srcRect/>
+          <a:stretch>
+            <a:fillRect/>
+          </a:stretch>
+        </p:blipFill>
+        <p:spPr bwMode="auto">
+          <a:xfrm>
+            <a:off x="11300737" y="4186679"/>
+            <a:ext cx="620715" cy="620715"/>
+          </a:xfrm>
+          <a:prstGeom prst="rect">
+            <a:avLst/>
+          </a:prstGeom>
+          <a:noFill/>
+          <a:extLst>
+            <a:ext uri="{909E8E84-426E-40DD-AFC4-6F175D3DCCD1}">
+              <a14:hiddenFill xmlns:a14="http://schemas.microsoft.com/office/drawing/2010/main">
+                <a:solidFill>
+                  <a:srgbClr val="FFFFFF"/>
+                </a:solidFill>
+              </a14:hiddenFill>
+            </a:ext>
+          </a:extLst>
+        </p:spPr>
+      </p:pic>
+      <p:cxnSp>
+        <p:nvCxnSpPr>
+          <p:cNvPr id="29" name="Straight Connector 28">
+            <a:extLst>
+              <a:ext uri="{FF2B5EF4-FFF2-40B4-BE49-F238E27FC236}">
+                <a16:creationId xmlns:a16="http://schemas.microsoft.com/office/drawing/2014/main" id="{DB208D06-CCCC-7443-8C4E-9474A09B5624}"/>
+              </a:ext>
+            </a:extLst>
+          </p:cNvPr>
+          <p:cNvCxnSpPr>
+            <a:cxnSpLocks/>
+          </p:cNvCxnSpPr>
+          <p:nvPr/>
+        </p:nvCxnSpPr>
+        <p:spPr>
+          <a:xfrm>
+            <a:off x="10972800" y="0"/>
+            <a:ext cx="0" cy="6858000"/>
+          </a:xfrm>
+          <a:prstGeom prst="line">
+            <a:avLst/>
+          </a:prstGeom>
+          <a:ln w="38100">
+            <a:solidFill>
+              <a:srgbClr val="FF0000"/>
+            </a:solidFill>
+          </a:ln>
+          <a:effectLst>
+            <a:glow rad="101600">
+              <a:schemeClr val="accent2">
+                <a:satMod val="175000"/>
+                <a:alpha val="40000"/>
+              </a:schemeClr>
+            </a:glow>
+          </a:effectLst>
+        </p:spPr>
+        <p:style>
+          <a:lnRef idx="1">
+            <a:schemeClr val="accent1"/>
+          </a:lnRef>
+          <a:fillRef idx="0">
+            <a:schemeClr val="accent1"/>
+          </a:fillRef>
+          <a:effectRef idx="0">
+            <a:schemeClr val="accent1"/>
+          </a:effectRef>
+          <a:fontRef idx="minor">
+            <a:schemeClr val="tx1"/>
+          </a:fontRef>
+        </p:style>
+      </p:cxnSp>
+      <p:sp>
+        <p:nvSpPr>
+          <p:cNvPr id="23" name="Subtitle 2">
+            <a:extLst>
+              <a:ext uri="{FF2B5EF4-FFF2-40B4-BE49-F238E27FC236}">
+                <a16:creationId xmlns:a16="http://schemas.microsoft.com/office/drawing/2014/main" id="{45CD0F5E-7482-7E48-A530-D5E008885DBA}"/>
+              </a:ext>
+            </a:extLst>
+          </p:cNvPr>
+          <p:cNvSpPr>
+            <a:spLocks noGrp="1"/>
+          </p:cNvSpPr>
+          <p:nvPr>
+            <p:ph type="subTitle" idx="1"/>
+          </p:nvPr>
+        </p:nvSpPr>
+        <p:spPr>
+          <a:xfrm>
+            <a:off x="1500864" y="1728017"/>
+            <a:ext cx="9144000" cy="2458662"/>
+          </a:xfrm>
+        </p:spPr>
+        <p:txBody>
+          <a:bodyPr>
+            <a:normAutofit/>
+          </a:bodyPr>
+          <a:lstStyle/>
+          <a:p>
+            <a:r>
+              <a:rPr lang="en-US" dirty="0"/>
+              <a:t>Player can move in a 2D environment</a:t>
+            </a:r>
+          </a:p>
+          <a:p>
+            <a:r>
+              <a:rPr lang="en-US" dirty="0"/>
+              <a:t>Toy-physics with acceleration and inertia</a:t>
+            </a:r>
+          </a:p>
+          <a:p>
+            <a:r>
+              <a:rPr lang="en-US" dirty="0"/>
+              <a:t>Player can shoot</a:t>
+            </a:r>
+          </a:p>
+          <a:p>
+            <a:r>
+              <a:rPr lang="en-US" dirty="0"/>
+              <a:t>Gain points by hitting a class of “goodies”</a:t>
+            </a:r>
+          </a:p>
+          <a:p>
+            <a:r>
+              <a:rPr lang="en-US" dirty="0"/>
+              <a:t>Lose lives by hitting the “baddies”, aka pineapples </a:t>
+            </a:r>
+          </a:p>
+        </p:txBody>
+      </p:sp>
+    </p:spTree>
+    <p:extLst>
+      <p:ext uri="{BB962C8B-B14F-4D97-AF65-F5344CB8AC3E}">
+        <p14:creationId xmlns:p14="http://schemas.microsoft.com/office/powerpoint/2010/main" val="1950350815"/>
+      </p:ext>
+    </p:extLst>
+  </p:cSld>
+  <p:clrMapOvr>
+    <a:masterClrMapping/>
+  </p:clrMapOvr>
+</p:sld>
+</file>
+
+<file path=ppt/slides/slide6.xml><?xml version="1.0" encoding="utf-8"?>
+<p:sld xmlns:a="http://schemas.openxmlformats.org/drawingml/2006/main" xmlns:r="http://schemas.openxmlformats.org/officeDocument/2006/relationships" xmlns:p="http://schemas.openxmlformats.org/presentationml/2006/main">
+  <p:cSld>
+    <p:spTree>
+      <p:nvGrpSpPr>
+        <p:cNvPr id="1" name=""/>
+        <p:cNvGrpSpPr/>
+        <p:nvPr/>
+      </p:nvGrpSpPr>
+      <p:grpSpPr>
+        <a:xfrm>
+          <a:off x="0" y="0"/>
+          <a:ext cx="0" cy="0"/>
+          <a:chOff x="0" y="0"/>
+          <a:chExt cx="0" cy="0"/>
+        </a:xfrm>
+      </p:grpSpPr>
+      <p:sp>
+        <p:nvSpPr>
+          <p:cNvPr id="11" name="TextBox 10">
+            <a:extLst>
+              <a:ext uri="{FF2B5EF4-FFF2-40B4-BE49-F238E27FC236}">
+                <a16:creationId xmlns:a16="http://schemas.microsoft.com/office/drawing/2014/main" id="{599CFB6F-1CDC-1E47-AD65-3A93F91E4C34}"/>
+              </a:ext>
+            </a:extLst>
+          </p:cNvPr>
+          <p:cNvSpPr txBox="1"/>
+          <p:nvPr/>
+        </p:nvSpPr>
+        <p:spPr>
+          <a:xfrm>
+            <a:off x="9653588" y="-615130"/>
+            <a:ext cx="45719" cy="45719"/>
+          </a:xfrm>
+          <a:prstGeom prst="rect">
+            <a:avLst/>
+          </a:prstGeom>
+          <a:noFill/>
+        </p:spPr>
+        <p:txBody>
+          <a:bodyPr wrap="square" rtlCol="0">
+            <a:spAutoFit/>
+          </a:bodyPr>
+          <a:lstStyle/>
+          <a:p>
+            <a:endParaRPr lang="en-US" dirty="0"/>
+          </a:p>
+        </p:txBody>
+      </p:sp>
+      <p:sp>
+        <p:nvSpPr>
+          <p:cNvPr id="13" name="TextBox 12">
+            <a:extLst>
+              <a:ext uri="{FF2B5EF4-FFF2-40B4-BE49-F238E27FC236}">
+                <a16:creationId xmlns:a16="http://schemas.microsoft.com/office/drawing/2014/main" id="{4C9F4712-0465-5142-8957-D4FE29B6C012}"/>
+              </a:ext>
+            </a:extLst>
+          </p:cNvPr>
+          <p:cNvSpPr txBox="1"/>
+          <p:nvPr/>
+        </p:nvSpPr>
+        <p:spPr>
+          <a:xfrm>
+            <a:off x="15687675" y="-1323155"/>
+            <a:ext cx="45719" cy="45719"/>
+          </a:xfrm>
+          <a:prstGeom prst="rect">
+            <a:avLst/>
+          </a:prstGeom>
+          <a:noFill/>
+        </p:spPr>
+        <p:txBody>
+          <a:bodyPr wrap="square" rtlCol="0">
+            <a:spAutoFit/>
+          </a:bodyPr>
+          <a:lstStyle/>
+          <a:p>
+            <a:endParaRPr lang="en-US" dirty="0"/>
+          </a:p>
+        </p:txBody>
+      </p:sp>
+      <p:sp>
+        <p:nvSpPr>
+          <p:cNvPr id="3" name="Rectangle 2">
+            <a:extLst>
+              <a:ext uri="{FF2B5EF4-FFF2-40B4-BE49-F238E27FC236}">
+                <a16:creationId xmlns:a16="http://schemas.microsoft.com/office/drawing/2014/main" id="{53A3E218-A5EC-7E4C-B83C-C8EE7042C7E2}"/>
+              </a:ext>
+            </a:extLst>
+          </p:cNvPr>
+          <p:cNvSpPr/>
+          <p:nvPr/>
+        </p:nvSpPr>
+        <p:spPr>
+          <a:xfrm>
+            <a:off x="5734247" y="366245"/>
+            <a:ext cx="819456" cy="461665"/>
+          </a:xfrm>
+          <a:prstGeom prst="rect">
+            <a:avLst/>
+          </a:prstGeom>
+        </p:spPr>
+        <p:txBody>
+          <a:bodyPr wrap="none">
+            <a:spAutoFit/>
+          </a:bodyPr>
+          <a:lstStyle/>
+          <a:p>
+            <a:pPr algn="ctr"/>
+            <a:r>
+              <a:rPr lang="en-US" sz="2400" b="1" i="1" dirty="0"/>
+              <a:t>Code</a:t>
+            </a:r>
+          </a:p>
+        </p:txBody>
+      </p:sp>
+      <p:pic>
+        <p:nvPicPr>
+          <p:cNvPr id="12" name="Picture 11">
+            <a:extLst>
+              <a:ext uri="{FF2B5EF4-FFF2-40B4-BE49-F238E27FC236}">
+                <a16:creationId xmlns:a16="http://schemas.microsoft.com/office/drawing/2014/main" id="{B37B57D4-DB61-9C4D-BDD7-4DEA862BF367}"/>
+              </a:ext>
+            </a:extLst>
+          </p:cNvPr>
+          <p:cNvPicPr>
+            <a:picLocks noChangeAspect="1"/>
+          </p:cNvPicPr>
+          <p:nvPr/>
+        </p:nvPicPr>
+        <p:blipFill>
+          <a:blip r:embed="rId2"/>
+          <a:stretch>
+            <a:fillRect/>
+          </a:stretch>
+        </p:blipFill>
+        <p:spPr>
+          <a:xfrm>
+            <a:off x="10972800" y="5010451"/>
+            <a:ext cx="1281365" cy="1674767"/>
+          </a:xfrm>
+          <a:prstGeom prst="rect">
+            <a:avLst/>
+          </a:prstGeom>
+        </p:spPr>
+      </p:pic>
+      <p:pic>
+        <p:nvPicPr>
+          <p:cNvPr id="14" name="Picture 8" descr="Music festival Icon, Singing golden decoration, poster, summer, fruit png |  PNGWing">
+            <a:extLst>
+              <a:ext uri="{FF2B5EF4-FFF2-40B4-BE49-F238E27FC236}">
+                <a16:creationId xmlns:a16="http://schemas.microsoft.com/office/drawing/2014/main" id="{B53078FF-FA5B-D54E-8CC0-E2C71AD2CAA7}"/>
+              </a:ext>
+            </a:extLst>
+          </p:cNvPr>
+          <p:cNvPicPr>
+            <a:picLocks noChangeAspect="1" noChangeArrowheads="1"/>
+          </p:cNvPicPr>
+          <p:nvPr/>
+        </p:nvPicPr>
+        <p:blipFill>
+          <a:blip r:embed="rId3">
+            <a:extLst>
+              <a:ext uri="{BEBA8EAE-BF5A-486C-A8C5-ECC9F3942E4B}">
+                <a14:imgProps xmlns:a14="http://schemas.microsoft.com/office/drawing/2010/main">
+                  <a14:imgLayer r:embed="rId4">
+                    <a14:imgEffect>
+                      <a14:backgroundRemoval t="10000" b="90000" l="10000" r="90000"/>
+                    </a14:imgEffect>
+                  </a14:imgLayer>
+                </a14:imgProps>
+              </a:ext>
+              <a:ext uri="{28A0092B-C50C-407E-A947-70E740481C1C}">
+                <a14:useLocalDpi xmlns:a14="http://schemas.microsoft.com/office/drawing/2010/main" val="0"/>
+              </a:ext>
+            </a:extLst>
+          </a:blip>
+          <a:srcRect/>
+          <a:stretch>
+            <a:fillRect/>
+          </a:stretch>
+        </p:blipFill>
+        <p:spPr bwMode="auto">
+          <a:xfrm>
+            <a:off x="11081081" y="182998"/>
+            <a:ext cx="891263" cy="1133113"/>
+          </a:xfrm>
+          <a:prstGeom prst="rect">
+            <a:avLst/>
+          </a:prstGeom>
+          <a:noFill/>
+          <a:extLst>
+            <a:ext uri="{909E8E84-426E-40DD-AFC4-6F175D3DCCD1}">
+              <a14:hiddenFill xmlns:a14="http://schemas.microsoft.com/office/drawing/2010/main">
+                <a:solidFill>
+                  <a:srgbClr val="FFFFFF"/>
+                </a:solidFill>
+              </a14:hiddenFill>
+            </a:ext>
+          </a:extLst>
+        </p:spPr>
+      </p:pic>
+      <p:pic>
+        <p:nvPicPr>
+          <p:cNvPr id="15" name="Picture 4" descr="Tomato - Free food icons">
+            <a:extLst>
+              <a:ext uri="{FF2B5EF4-FFF2-40B4-BE49-F238E27FC236}">
+                <a16:creationId xmlns:a16="http://schemas.microsoft.com/office/drawing/2014/main" id="{00D1D9D5-244A-9D45-82B9-F8300EBA7A10}"/>
+              </a:ext>
+            </a:extLst>
+          </p:cNvPr>
+          <p:cNvPicPr>
+            <a:picLocks noChangeAspect="1" noChangeArrowheads="1"/>
+          </p:cNvPicPr>
+          <p:nvPr/>
+        </p:nvPicPr>
+        <p:blipFill>
+          <a:blip r:embed="rId5">
+            <a:extLst>
+              <a:ext uri="{28A0092B-C50C-407E-A947-70E740481C1C}">
+                <a14:useLocalDpi xmlns:a14="http://schemas.microsoft.com/office/drawing/2010/main" val="0"/>
+              </a:ext>
+            </a:extLst>
+          </a:blip>
+          <a:srcRect/>
+          <a:stretch>
+            <a:fillRect/>
+          </a:stretch>
+        </p:blipFill>
+        <p:spPr bwMode="auto">
+          <a:xfrm>
+            <a:off x="11300737" y="2933700"/>
+            <a:ext cx="671607" cy="671607"/>
+          </a:xfrm>
+          <a:prstGeom prst="rect">
+            <a:avLst/>
+          </a:prstGeom>
+          <a:noFill/>
+          <a:extLst>
+            <a:ext uri="{909E8E84-426E-40DD-AFC4-6F175D3DCCD1}">
+              <a14:hiddenFill xmlns:a14="http://schemas.microsoft.com/office/drawing/2010/main">
+                <a:solidFill>
+                  <a:srgbClr val="FFFFFF"/>
+                </a:solidFill>
+              </a14:hiddenFill>
+            </a:ext>
+          </a:extLst>
+        </p:spPr>
+      </p:pic>
+      <p:pic>
+        <p:nvPicPr>
+          <p:cNvPr id="16" name="Picture 6" descr="Mozzarella Di Bufala Icon On Transparent Background Stock Illustration -  Download Image Now - iStock">
+            <a:extLst>
+              <a:ext uri="{FF2B5EF4-FFF2-40B4-BE49-F238E27FC236}">
+                <a16:creationId xmlns:a16="http://schemas.microsoft.com/office/drawing/2014/main" id="{76BCD4CB-0035-1741-B2F8-600B920F880D}"/>
+              </a:ext>
+            </a:extLst>
+          </p:cNvPr>
+          <p:cNvPicPr>
+            <a:picLocks noChangeAspect="1" noChangeArrowheads="1"/>
+          </p:cNvPicPr>
+          <p:nvPr/>
+        </p:nvPicPr>
+        <p:blipFill>
+          <a:blip r:embed="rId6">
+            <a:extLst>
+              <a:ext uri="{28A0092B-C50C-407E-A947-70E740481C1C}">
+                <a14:useLocalDpi xmlns:a14="http://schemas.microsoft.com/office/drawing/2010/main" val="0"/>
+              </a:ext>
+            </a:extLst>
+          </a:blip>
+          <a:srcRect/>
+          <a:stretch>
+            <a:fillRect/>
+          </a:stretch>
+        </p:blipFill>
+        <p:spPr bwMode="auto">
+          <a:xfrm>
+            <a:off x="11275290" y="1789102"/>
+            <a:ext cx="671607" cy="671607"/>
+          </a:xfrm>
+          <a:prstGeom prst="rect">
+            <a:avLst/>
+          </a:prstGeom>
+          <a:noFill/>
+          <a:extLst>
+            <a:ext uri="{909E8E84-426E-40DD-AFC4-6F175D3DCCD1}">
+              <a14:hiddenFill xmlns:a14="http://schemas.microsoft.com/office/drawing/2010/main">
+                <a:solidFill>
+                  <a:srgbClr val="FFFFFF"/>
+                </a:solidFill>
+              </a14:hiddenFill>
+            </a:ext>
+          </a:extLst>
+        </p:spPr>
+      </p:pic>
+      <p:pic>
+        <p:nvPicPr>
+          <p:cNvPr id="17" name="Picture 14" descr="Herb Basil Icon | 3D Food Iconset | Icons-Land">
+            <a:extLst>
+              <a:ext uri="{FF2B5EF4-FFF2-40B4-BE49-F238E27FC236}">
+                <a16:creationId xmlns:a16="http://schemas.microsoft.com/office/drawing/2014/main" id="{69237BBB-ACD5-1846-8DE7-52288CD945C2}"/>
+              </a:ext>
+            </a:extLst>
+          </p:cNvPr>
+          <p:cNvPicPr>
+            <a:picLocks noChangeAspect="1" noChangeArrowheads="1"/>
+          </p:cNvPicPr>
+          <p:nvPr/>
+        </p:nvPicPr>
+        <p:blipFill>
+          <a:blip r:embed="rId7">
+            <a:extLst>
+              <a:ext uri="{28A0092B-C50C-407E-A947-70E740481C1C}">
+                <a14:useLocalDpi xmlns:a14="http://schemas.microsoft.com/office/drawing/2010/main" val="0"/>
+              </a:ext>
+            </a:extLst>
+          </a:blip>
+          <a:srcRect/>
+          <a:stretch>
+            <a:fillRect/>
+          </a:stretch>
+        </p:blipFill>
+        <p:spPr bwMode="auto">
+          <a:xfrm>
+            <a:off x="11300737" y="4186679"/>
+            <a:ext cx="620715" cy="620715"/>
+          </a:xfrm>
+          <a:prstGeom prst="rect">
+            <a:avLst/>
+          </a:prstGeom>
+          <a:noFill/>
+          <a:extLst>
+            <a:ext uri="{909E8E84-426E-40DD-AFC4-6F175D3DCCD1}">
+              <a14:hiddenFill xmlns:a14="http://schemas.microsoft.com/office/drawing/2010/main">
+                <a:solidFill>
+                  <a:srgbClr val="FFFFFF"/>
+                </a:solidFill>
+              </a14:hiddenFill>
+            </a:ext>
+          </a:extLst>
+        </p:spPr>
+      </p:pic>
+      <p:cxnSp>
+        <p:nvCxnSpPr>
+          <p:cNvPr id="29" name="Straight Connector 28">
+            <a:extLst>
+              <a:ext uri="{FF2B5EF4-FFF2-40B4-BE49-F238E27FC236}">
+                <a16:creationId xmlns:a16="http://schemas.microsoft.com/office/drawing/2014/main" id="{DB208D06-CCCC-7443-8C4E-9474A09B5624}"/>
+              </a:ext>
+            </a:extLst>
+          </p:cNvPr>
+          <p:cNvCxnSpPr>
+            <a:cxnSpLocks/>
+          </p:cNvCxnSpPr>
+          <p:nvPr/>
+        </p:nvCxnSpPr>
+        <p:spPr>
+          <a:xfrm>
+            <a:off x="10972800" y="0"/>
+            <a:ext cx="0" cy="6858000"/>
+          </a:xfrm>
+          <a:prstGeom prst="line">
+            <a:avLst/>
+          </a:prstGeom>
+          <a:ln w="38100">
+            <a:solidFill>
+              <a:srgbClr val="FF0000"/>
+            </a:solidFill>
+          </a:ln>
+          <a:effectLst>
+            <a:glow rad="101600">
+              <a:schemeClr val="accent2">
+                <a:satMod val="175000"/>
+                <a:alpha val="40000"/>
+              </a:schemeClr>
+            </a:glow>
+          </a:effectLst>
+        </p:spPr>
+        <p:style>
+          <a:lnRef idx="1">
+            <a:schemeClr val="accent1"/>
+          </a:lnRef>
+          <a:fillRef idx="0">
+            <a:schemeClr val="accent1"/>
+          </a:fillRef>
+          <a:effectRef idx="0">
+            <a:schemeClr val="accent1"/>
+          </a:effectRef>
+          <a:fontRef idx="minor">
+            <a:schemeClr val="tx1"/>
+          </a:fontRef>
+        </p:style>
+      </p:cxnSp>
+      <p:sp>
+        <p:nvSpPr>
+          <p:cNvPr id="23" name="Subtitle 2">
+            <a:extLst>
+              <a:ext uri="{FF2B5EF4-FFF2-40B4-BE49-F238E27FC236}">
+                <a16:creationId xmlns:a16="http://schemas.microsoft.com/office/drawing/2014/main" id="{45CD0F5E-7482-7E48-A530-D5E008885DBA}"/>
+              </a:ext>
+            </a:extLst>
+          </p:cNvPr>
+          <p:cNvSpPr>
+            <a:spLocks noGrp="1"/>
+          </p:cNvSpPr>
+          <p:nvPr>
+            <p:ph type="subTitle" idx="1"/>
+          </p:nvPr>
+        </p:nvSpPr>
+        <p:spPr>
+          <a:xfrm>
+            <a:off x="1500864" y="1728016"/>
+            <a:ext cx="9144000" cy="4119533"/>
+          </a:xfrm>
+        </p:spPr>
+        <p:txBody>
+          <a:bodyPr>
+            <a:normAutofit/>
+          </a:bodyPr>
+          <a:lstStyle/>
+          <a:p>
+            <a:r>
+              <a:rPr lang="en-US" dirty="0"/>
+              <a:t>5 classes: Game, Player, Goodies, Baddies &amp; Bullets</a:t>
+            </a:r>
+          </a:p>
+          <a:p>
+            <a:endParaRPr lang="en-US" dirty="0"/>
+          </a:p>
+          <a:p>
+            <a:r>
+              <a:rPr lang="en-US" dirty="0"/>
+              <a:t>Game class manages:</a:t>
+            </a:r>
+          </a:p>
+          <a:p>
+            <a:r>
+              <a:rPr lang="en-US" dirty="0"/>
+              <a:t>1 – collision check (player, NPC, bullets)</a:t>
+            </a:r>
+          </a:p>
+          <a:p>
+            <a:r>
+              <a:rPr lang="en-US" dirty="0"/>
+              <a:t>2 – objects life cycle (creation, deletion)</a:t>
+            </a:r>
+          </a:p>
+          <a:p>
+            <a:r>
+              <a:rPr lang="en-US" dirty="0"/>
+              <a:t>2 – user events</a:t>
+            </a:r>
+          </a:p>
+          <a:p>
+            <a:r>
+              <a:rPr lang="en-US" dirty="0"/>
+              <a:t>3 – game loop</a:t>
+            </a:r>
+          </a:p>
+          <a:p>
+            <a:r>
+              <a:rPr lang="en-US" dirty="0"/>
+              <a:t>4 – game over status</a:t>
+            </a:r>
+          </a:p>
+        </p:txBody>
+      </p:sp>
+    </p:spTree>
+    <p:extLst>
+      <p:ext uri="{BB962C8B-B14F-4D97-AF65-F5344CB8AC3E}">
+        <p14:creationId xmlns:p14="http://schemas.microsoft.com/office/powerpoint/2010/main" val="2261030167"/>
+      </p:ext>
+    </p:extLst>
+  </p:cSld>
+  <p:clrMapOvr>
+    <a:masterClrMapping/>
+  </p:clrMapOvr>
+</p:sld>
+</file>
+
+<file path=ppt/slides/slide7.xml><?xml version="1.0" encoding="utf-8"?>
+<p:sld xmlns:a="http://schemas.openxmlformats.org/drawingml/2006/main" xmlns:r="http://schemas.openxmlformats.org/officeDocument/2006/relationships" xmlns:p="http://schemas.openxmlformats.org/presentationml/2006/main">
+  <p:cSld>
+    <p:spTree>
+      <p:nvGrpSpPr>
+        <p:cNvPr id="1" name=""/>
+        <p:cNvGrpSpPr/>
+        <p:nvPr/>
+      </p:nvGrpSpPr>
+      <p:grpSpPr>
+        <a:xfrm>
+          <a:off x="0" y="0"/>
+          <a:ext cx="0" cy="0"/>
+          <a:chOff x="0" y="0"/>
+          <a:chExt cx="0" cy="0"/>
+        </a:xfrm>
+      </p:grpSpPr>
+      <p:sp>
+        <p:nvSpPr>
+          <p:cNvPr id="11" name="TextBox 10">
+            <a:extLst>
+              <a:ext uri="{FF2B5EF4-FFF2-40B4-BE49-F238E27FC236}">
+                <a16:creationId xmlns:a16="http://schemas.microsoft.com/office/drawing/2014/main" id="{599CFB6F-1CDC-1E47-AD65-3A93F91E4C34}"/>
+              </a:ext>
+            </a:extLst>
+          </p:cNvPr>
+          <p:cNvSpPr txBox="1"/>
+          <p:nvPr/>
+        </p:nvSpPr>
+        <p:spPr>
+          <a:xfrm>
+            <a:off x="9653588" y="-615130"/>
+            <a:ext cx="45719" cy="45719"/>
+          </a:xfrm>
+          <a:prstGeom prst="rect">
+            <a:avLst/>
+          </a:prstGeom>
+          <a:noFill/>
+        </p:spPr>
+        <p:txBody>
+          <a:bodyPr wrap="square" rtlCol="0">
+            <a:spAutoFit/>
+          </a:bodyPr>
+          <a:lstStyle/>
+          <a:p>
+            <a:endParaRPr lang="en-US" dirty="0"/>
+          </a:p>
+        </p:txBody>
+      </p:sp>
+      <p:sp>
+        <p:nvSpPr>
+          <p:cNvPr id="13" name="TextBox 12">
+            <a:extLst>
+              <a:ext uri="{FF2B5EF4-FFF2-40B4-BE49-F238E27FC236}">
+                <a16:creationId xmlns:a16="http://schemas.microsoft.com/office/drawing/2014/main" id="{4C9F4712-0465-5142-8957-D4FE29B6C012}"/>
+              </a:ext>
+            </a:extLst>
+          </p:cNvPr>
+          <p:cNvSpPr txBox="1"/>
+          <p:nvPr/>
+        </p:nvSpPr>
+        <p:spPr>
+          <a:xfrm>
+            <a:off x="15687675" y="-1323155"/>
+            <a:ext cx="45719" cy="45719"/>
+          </a:xfrm>
+          <a:prstGeom prst="rect">
+            <a:avLst/>
+          </a:prstGeom>
+          <a:noFill/>
+        </p:spPr>
+        <p:txBody>
+          <a:bodyPr wrap="square" rtlCol="0">
+            <a:spAutoFit/>
+          </a:bodyPr>
+          <a:lstStyle/>
+          <a:p>
+            <a:endParaRPr lang="en-US" dirty="0"/>
+          </a:p>
+        </p:txBody>
+      </p:sp>
+      <p:sp>
+        <p:nvSpPr>
+          <p:cNvPr id="3" name="Rectangle 2">
+            <a:extLst>
+              <a:ext uri="{FF2B5EF4-FFF2-40B4-BE49-F238E27FC236}">
+                <a16:creationId xmlns:a16="http://schemas.microsoft.com/office/drawing/2014/main" id="{53A3E218-A5EC-7E4C-B83C-C8EE7042C7E2}"/>
+              </a:ext>
+            </a:extLst>
+          </p:cNvPr>
+          <p:cNvSpPr/>
+          <p:nvPr/>
+        </p:nvSpPr>
+        <p:spPr>
+          <a:xfrm>
+            <a:off x="5052813" y="366245"/>
+            <a:ext cx="2182329" cy="461665"/>
+          </a:xfrm>
+          <a:prstGeom prst="rect">
+            <a:avLst/>
+          </a:prstGeom>
+        </p:spPr>
+        <p:txBody>
+          <a:bodyPr wrap="none">
+            <a:spAutoFit/>
+          </a:bodyPr>
+          <a:lstStyle/>
+          <a:p>
+            <a:pPr algn="ctr"/>
+            <a:r>
+              <a:rPr lang="en-US" sz="2400" b="1" i="1" dirty="0"/>
+              <a:t>Future Features</a:t>
+            </a:r>
+          </a:p>
+        </p:txBody>
+      </p:sp>
+      <p:pic>
+        <p:nvPicPr>
+          <p:cNvPr id="12" name="Picture 11">
+            <a:extLst>
+              <a:ext uri="{FF2B5EF4-FFF2-40B4-BE49-F238E27FC236}">
+                <a16:creationId xmlns:a16="http://schemas.microsoft.com/office/drawing/2014/main" id="{B37B57D4-DB61-9C4D-BDD7-4DEA862BF367}"/>
+              </a:ext>
+            </a:extLst>
+          </p:cNvPr>
+          <p:cNvPicPr>
+            <a:picLocks noChangeAspect="1"/>
+          </p:cNvPicPr>
+          <p:nvPr/>
+        </p:nvPicPr>
+        <p:blipFill>
+          <a:blip r:embed="rId2"/>
+          <a:stretch>
+            <a:fillRect/>
+          </a:stretch>
+        </p:blipFill>
+        <p:spPr>
+          <a:xfrm>
+            <a:off x="10972800" y="5010451"/>
+            <a:ext cx="1281365" cy="1674767"/>
+          </a:xfrm>
+          <a:prstGeom prst="rect">
+            <a:avLst/>
+          </a:prstGeom>
+        </p:spPr>
+      </p:pic>
+      <p:pic>
+        <p:nvPicPr>
+          <p:cNvPr id="14" name="Picture 8" descr="Music festival Icon, Singing golden decoration, poster, summer, fruit png |  PNGWing">
+            <a:extLst>
+              <a:ext uri="{FF2B5EF4-FFF2-40B4-BE49-F238E27FC236}">
+                <a16:creationId xmlns:a16="http://schemas.microsoft.com/office/drawing/2014/main" id="{B53078FF-FA5B-D54E-8CC0-E2C71AD2CAA7}"/>
+              </a:ext>
+            </a:extLst>
+          </p:cNvPr>
+          <p:cNvPicPr>
+            <a:picLocks noChangeAspect="1" noChangeArrowheads="1"/>
+          </p:cNvPicPr>
+          <p:nvPr/>
+        </p:nvPicPr>
+        <p:blipFill>
+          <a:blip r:embed="rId3">
+            <a:extLst>
+              <a:ext uri="{BEBA8EAE-BF5A-486C-A8C5-ECC9F3942E4B}">
+                <a14:imgProps xmlns:a14="http://schemas.microsoft.com/office/drawing/2010/main">
+                  <a14:imgLayer r:embed="rId4">
+                    <a14:imgEffect>
+                      <a14:backgroundRemoval t="10000" b="90000" l="10000" r="90000"/>
+                    </a14:imgEffect>
+                  </a14:imgLayer>
+                </a14:imgProps>
+              </a:ext>
+              <a:ext uri="{28A0092B-C50C-407E-A947-70E740481C1C}">
+                <a14:useLocalDpi xmlns:a14="http://schemas.microsoft.com/office/drawing/2010/main" val="0"/>
+              </a:ext>
+            </a:extLst>
+          </a:blip>
+          <a:srcRect/>
+          <a:stretch>
+            <a:fillRect/>
+          </a:stretch>
+        </p:blipFill>
+        <p:spPr bwMode="auto">
+          <a:xfrm>
+            <a:off x="11081081" y="182998"/>
+            <a:ext cx="891263" cy="1133113"/>
+          </a:xfrm>
+          <a:prstGeom prst="rect">
+            <a:avLst/>
+          </a:prstGeom>
+          <a:noFill/>
+          <a:extLst>
+            <a:ext uri="{909E8E84-426E-40DD-AFC4-6F175D3DCCD1}">
+              <a14:hiddenFill xmlns:a14="http://schemas.microsoft.com/office/drawing/2010/main">
+                <a:solidFill>
+                  <a:srgbClr val="FFFFFF"/>
+                </a:solidFill>
+              </a14:hiddenFill>
+            </a:ext>
+          </a:extLst>
+        </p:spPr>
+      </p:pic>
+      <p:pic>
+        <p:nvPicPr>
+          <p:cNvPr id="15" name="Picture 4" descr="Tomato - Free food icons">
+            <a:extLst>
+              <a:ext uri="{FF2B5EF4-FFF2-40B4-BE49-F238E27FC236}">
+                <a16:creationId xmlns:a16="http://schemas.microsoft.com/office/drawing/2014/main" id="{00D1D9D5-244A-9D45-82B9-F8300EBA7A10}"/>
+              </a:ext>
+            </a:extLst>
+          </p:cNvPr>
+          <p:cNvPicPr>
+            <a:picLocks noChangeAspect="1" noChangeArrowheads="1"/>
+          </p:cNvPicPr>
+          <p:nvPr/>
+        </p:nvPicPr>
+        <p:blipFill>
+          <a:blip r:embed="rId5">
+            <a:extLst>
+              <a:ext uri="{28A0092B-C50C-407E-A947-70E740481C1C}">
+                <a14:useLocalDpi xmlns:a14="http://schemas.microsoft.com/office/drawing/2010/main" val="0"/>
+              </a:ext>
+            </a:extLst>
+          </a:blip>
+          <a:srcRect/>
+          <a:stretch>
+            <a:fillRect/>
+          </a:stretch>
+        </p:blipFill>
+        <p:spPr bwMode="auto">
+          <a:xfrm>
+            <a:off x="11300737" y="2933700"/>
+            <a:ext cx="671607" cy="671607"/>
+          </a:xfrm>
+          <a:prstGeom prst="rect">
+            <a:avLst/>
+          </a:prstGeom>
+          <a:noFill/>
+          <a:extLst>
+            <a:ext uri="{909E8E84-426E-40DD-AFC4-6F175D3DCCD1}">
+              <a14:hiddenFill xmlns:a14="http://schemas.microsoft.com/office/drawing/2010/main">
+                <a:solidFill>
+                  <a:srgbClr val="FFFFFF"/>
+                </a:solidFill>
+              </a14:hiddenFill>
+            </a:ext>
+          </a:extLst>
+        </p:spPr>
+      </p:pic>
+      <p:pic>
+        <p:nvPicPr>
+          <p:cNvPr id="16" name="Picture 6" descr="Mozzarella Di Bufala Icon On Transparent Background Stock Illustration -  Download Image Now - iStock">
+            <a:extLst>
+              <a:ext uri="{FF2B5EF4-FFF2-40B4-BE49-F238E27FC236}">
+                <a16:creationId xmlns:a16="http://schemas.microsoft.com/office/drawing/2014/main" id="{76BCD4CB-0035-1741-B2F8-600B920F880D}"/>
+              </a:ext>
+            </a:extLst>
+          </p:cNvPr>
+          <p:cNvPicPr>
+            <a:picLocks noChangeAspect="1" noChangeArrowheads="1"/>
+          </p:cNvPicPr>
+          <p:nvPr/>
+        </p:nvPicPr>
+        <p:blipFill>
+          <a:blip r:embed="rId6">
+            <a:extLst>
+              <a:ext uri="{28A0092B-C50C-407E-A947-70E740481C1C}">
+                <a14:useLocalDpi xmlns:a14="http://schemas.microsoft.com/office/drawing/2010/main" val="0"/>
+              </a:ext>
+            </a:extLst>
+          </a:blip>
+          <a:srcRect/>
+          <a:stretch>
+            <a:fillRect/>
+          </a:stretch>
+        </p:blipFill>
+        <p:spPr bwMode="auto">
+          <a:xfrm>
+            <a:off x="11275290" y="1789102"/>
+            <a:ext cx="671607" cy="671607"/>
+          </a:xfrm>
+          <a:prstGeom prst="rect">
+            <a:avLst/>
+          </a:prstGeom>
+          <a:noFill/>
+          <a:extLst>
+            <a:ext uri="{909E8E84-426E-40DD-AFC4-6F175D3DCCD1}">
+              <a14:hiddenFill xmlns:a14="http://schemas.microsoft.com/office/drawing/2010/main">
+                <a:solidFill>
+                  <a:srgbClr val="FFFFFF"/>
+                </a:solidFill>
+              </a14:hiddenFill>
+            </a:ext>
+          </a:extLst>
+        </p:spPr>
+      </p:pic>
+      <p:pic>
+        <p:nvPicPr>
+          <p:cNvPr id="17" name="Picture 14" descr="Herb Basil Icon | 3D Food Iconset | Icons-Land">
+            <a:extLst>
+              <a:ext uri="{FF2B5EF4-FFF2-40B4-BE49-F238E27FC236}">
+                <a16:creationId xmlns:a16="http://schemas.microsoft.com/office/drawing/2014/main" id="{69237BBB-ACD5-1846-8DE7-52288CD945C2}"/>
+              </a:ext>
+            </a:extLst>
+          </p:cNvPr>
+          <p:cNvPicPr>
+            <a:picLocks noChangeAspect="1" noChangeArrowheads="1"/>
+          </p:cNvPicPr>
+          <p:nvPr/>
+        </p:nvPicPr>
+        <p:blipFill>
+          <a:blip r:embed="rId7">
+            <a:extLst>
+              <a:ext uri="{28A0092B-C50C-407E-A947-70E740481C1C}">
+                <a14:useLocalDpi xmlns:a14="http://schemas.microsoft.com/office/drawing/2010/main" val="0"/>
+              </a:ext>
+            </a:extLst>
+          </a:blip>
+          <a:srcRect/>
+          <a:stretch>
+            <a:fillRect/>
+          </a:stretch>
+        </p:blipFill>
+        <p:spPr bwMode="auto">
+          <a:xfrm>
+            <a:off x="11300737" y="4186679"/>
+            <a:ext cx="620715" cy="620715"/>
+          </a:xfrm>
+          <a:prstGeom prst="rect">
+            <a:avLst/>
+          </a:prstGeom>
+          <a:noFill/>
+          <a:extLst>
+            <a:ext uri="{909E8E84-426E-40DD-AFC4-6F175D3DCCD1}">
+              <a14:hiddenFill xmlns:a14="http://schemas.microsoft.com/office/drawing/2010/main">
+                <a:solidFill>
+                  <a:srgbClr val="FFFFFF"/>
+                </a:solidFill>
+              </a14:hiddenFill>
+            </a:ext>
+          </a:extLst>
+        </p:spPr>
+      </p:pic>
+      <p:cxnSp>
+        <p:nvCxnSpPr>
+          <p:cNvPr id="29" name="Straight Connector 28">
+            <a:extLst>
+              <a:ext uri="{FF2B5EF4-FFF2-40B4-BE49-F238E27FC236}">
+                <a16:creationId xmlns:a16="http://schemas.microsoft.com/office/drawing/2014/main" id="{DB208D06-CCCC-7443-8C4E-9474A09B5624}"/>
+              </a:ext>
+            </a:extLst>
+          </p:cNvPr>
+          <p:cNvCxnSpPr>
+            <a:cxnSpLocks/>
+          </p:cNvCxnSpPr>
+          <p:nvPr/>
+        </p:nvCxnSpPr>
+        <p:spPr>
+          <a:xfrm>
+            <a:off x="10972800" y="0"/>
+            <a:ext cx="0" cy="6858000"/>
+          </a:xfrm>
+          <a:prstGeom prst="line">
+            <a:avLst/>
+          </a:prstGeom>
+          <a:ln w="38100">
+            <a:solidFill>
+              <a:srgbClr val="FF0000"/>
+            </a:solidFill>
+          </a:ln>
+          <a:effectLst>
+            <a:glow rad="101600">
+              <a:schemeClr val="accent2">
+                <a:satMod val="175000"/>
+                <a:alpha val="40000"/>
+              </a:schemeClr>
+            </a:glow>
+          </a:effectLst>
+        </p:spPr>
+        <p:style>
+          <a:lnRef idx="1">
+            <a:schemeClr val="accent1"/>
+          </a:lnRef>
+          <a:fillRef idx="0">
+            <a:schemeClr val="accent1"/>
+          </a:fillRef>
+          <a:effectRef idx="0">
+            <a:schemeClr val="accent1"/>
+          </a:effectRef>
+          <a:fontRef idx="minor">
+            <a:schemeClr val="tx1"/>
+          </a:fontRef>
+        </p:style>
+      </p:cxnSp>
+      <p:sp>
+        <p:nvSpPr>
+          <p:cNvPr id="23" name="Subtitle 2">
+            <a:extLst>
+              <a:ext uri="{FF2B5EF4-FFF2-40B4-BE49-F238E27FC236}">
+                <a16:creationId xmlns:a16="http://schemas.microsoft.com/office/drawing/2014/main" id="{45CD0F5E-7482-7E48-A530-D5E008885DBA}"/>
+              </a:ext>
+            </a:extLst>
+          </p:cNvPr>
+          <p:cNvSpPr>
+            <a:spLocks noGrp="1"/>
+          </p:cNvSpPr>
+          <p:nvPr>
+            <p:ph type="subTitle" idx="1"/>
+          </p:nvPr>
+        </p:nvSpPr>
+        <p:spPr>
+          <a:xfrm>
+            <a:off x="1500864" y="1728016"/>
+            <a:ext cx="9144000" cy="4119533"/>
+          </a:xfrm>
+        </p:spPr>
+        <p:txBody>
+          <a:bodyPr>
+            <a:normAutofit/>
+          </a:bodyPr>
+          <a:lstStyle/>
+          <a:p>
+            <a:r>
+              <a:rPr lang="en-US" dirty="0"/>
+              <a:t>Add more recipes / themes</a:t>
+            </a:r>
+          </a:p>
+          <a:p>
+            <a:endParaRPr lang="en-US" dirty="0"/>
+          </a:p>
+          <a:p>
+            <a:r>
+              <a:rPr lang="en-US" dirty="0"/>
+              <a:t>Add animations</a:t>
+            </a:r>
+          </a:p>
+          <a:p>
+            <a:endParaRPr lang="en-US" dirty="0"/>
+          </a:p>
+          <a:p>
+            <a:r>
+              <a:rPr lang="en-US" dirty="0"/>
+              <a:t>Add </a:t>
+            </a:r>
+            <a:r>
+              <a:rPr lang="en-US" dirty="0" err="1"/>
+              <a:t>PizzaBase</a:t>
+            </a:r>
+            <a:r>
+              <a:rPr lang="en-US" dirty="0"/>
+              <a:t> with tricky landing mini-game </a:t>
+            </a:r>
+          </a:p>
+          <a:p>
+            <a:endParaRPr lang="en-US" dirty="0"/>
+          </a:p>
+          <a:p>
+            <a:r>
+              <a:rPr lang="en-US" dirty="0"/>
+              <a:t>Complete game refactoring </a:t>
+            </a:r>
+          </a:p>
+        </p:txBody>
+      </p:sp>
+    </p:spTree>
+    <p:extLst>
+      <p:ext uri="{BB962C8B-B14F-4D97-AF65-F5344CB8AC3E}">
+        <p14:creationId xmlns:p14="http://schemas.microsoft.com/office/powerpoint/2010/main" val="1590690670"/>
+      </p:ext>
+    </p:extLst>
+  </p:cSld>
+  <p:clrMapOvr>
+    <a:masterClrMapping/>
+  </p:clrMapOvr>
+</p:sld>
+</file>
+
+<file path=ppt/slides/slide8.xml><?xml version="1.0" encoding="utf-8"?>
+<p:sld xmlns:a="http://schemas.openxmlformats.org/drawingml/2006/main" xmlns:r="http://schemas.openxmlformats.org/officeDocument/2006/relationships" xmlns:p="http://schemas.openxmlformats.org/presentationml/2006/main">
+  <p:cSld>
+    <p:spTree>
+      <p:nvGrpSpPr>
+        <p:cNvPr id="1" name=""/>
+        <p:cNvGrpSpPr/>
+        <p:nvPr/>
+      </p:nvGrpSpPr>
+      <p:grpSpPr>
+        <a:xfrm>
+          <a:off x="0" y="0"/>
+          <a:ext cx="0" cy="0"/>
+          <a:chOff x="0" y="0"/>
+          <a:chExt cx="0" cy="0"/>
+        </a:xfrm>
+      </p:grpSpPr>
+      <p:sp>
+        <p:nvSpPr>
+          <p:cNvPr id="11" name="TextBox 10">
+            <a:extLst>
+              <a:ext uri="{FF2B5EF4-FFF2-40B4-BE49-F238E27FC236}">
+                <a16:creationId xmlns:a16="http://schemas.microsoft.com/office/drawing/2014/main" id="{599CFB6F-1CDC-1E47-AD65-3A93F91E4C34}"/>
+              </a:ext>
+            </a:extLst>
+          </p:cNvPr>
+          <p:cNvSpPr txBox="1"/>
+          <p:nvPr/>
+        </p:nvSpPr>
+        <p:spPr>
+          <a:xfrm>
+            <a:off x="9653588" y="-615130"/>
+            <a:ext cx="45719" cy="45719"/>
+          </a:xfrm>
+          <a:prstGeom prst="rect">
+            <a:avLst/>
+          </a:prstGeom>
+          <a:noFill/>
+        </p:spPr>
+        <p:txBody>
+          <a:bodyPr wrap="square" rtlCol="0">
+            <a:spAutoFit/>
+          </a:bodyPr>
+          <a:lstStyle/>
+          <a:p>
+            <a:endParaRPr lang="en-US" dirty="0"/>
+          </a:p>
+        </p:txBody>
+      </p:sp>
+      <p:sp>
+        <p:nvSpPr>
+          <p:cNvPr id="13" name="TextBox 12">
+            <a:extLst>
+              <a:ext uri="{FF2B5EF4-FFF2-40B4-BE49-F238E27FC236}">
+                <a16:creationId xmlns:a16="http://schemas.microsoft.com/office/drawing/2014/main" id="{4C9F4712-0465-5142-8957-D4FE29B6C012}"/>
+              </a:ext>
+            </a:extLst>
+          </p:cNvPr>
+          <p:cNvSpPr txBox="1"/>
+          <p:nvPr/>
+        </p:nvSpPr>
+        <p:spPr>
+          <a:xfrm>
+            <a:off x="15687675" y="-1323155"/>
+            <a:ext cx="45719" cy="45719"/>
+          </a:xfrm>
+          <a:prstGeom prst="rect">
+            <a:avLst/>
+          </a:prstGeom>
+          <a:noFill/>
+        </p:spPr>
+        <p:txBody>
+          <a:bodyPr wrap="square" rtlCol="0">
+            <a:spAutoFit/>
+          </a:bodyPr>
+          <a:lstStyle/>
+          <a:p>
+            <a:endParaRPr lang="en-US" dirty="0"/>
+          </a:p>
+        </p:txBody>
+      </p:sp>
+      <p:sp>
+        <p:nvSpPr>
+          <p:cNvPr id="3" name="Rectangle 2">
+            <a:extLst>
+              <a:ext uri="{FF2B5EF4-FFF2-40B4-BE49-F238E27FC236}">
+                <a16:creationId xmlns:a16="http://schemas.microsoft.com/office/drawing/2014/main" id="{53A3E218-A5EC-7E4C-B83C-C8EE7042C7E2}"/>
+              </a:ext>
+            </a:extLst>
+          </p:cNvPr>
+          <p:cNvSpPr/>
+          <p:nvPr/>
+        </p:nvSpPr>
+        <p:spPr>
+          <a:xfrm>
+            <a:off x="4676432" y="366245"/>
+            <a:ext cx="2935099" cy="461665"/>
+          </a:xfrm>
+          <a:prstGeom prst="rect">
+            <a:avLst/>
+          </a:prstGeom>
+        </p:spPr>
+        <p:txBody>
+          <a:bodyPr wrap="none">
+            <a:spAutoFit/>
+          </a:bodyPr>
+          <a:lstStyle/>
+          <a:p>
+            <a:pPr algn="ctr"/>
+            <a:r>
+              <a:rPr lang="en-US" sz="2400" b="1" i="1" dirty="0"/>
+              <a:t>Starting From Scratch</a:t>
+            </a:r>
+          </a:p>
+        </p:txBody>
+      </p:sp>
+      <p:pic>
+        <p:nvPicPr>
+          <p:cNvPr id="12" name="Picture 11">
+            <a:extLst>
+              <a:ext uri="{FF2B5EF4-FFF2-40B4-BE49-F238E27FC236}">
+                <a16:creationId xmlns:a16="http://schemas.microsoft.com/office/drawing/2014/main" id="{B37B57D4-DB61-9C4D-BDD7-4DEA862BF367}"/>
+              </a:ext>
+            </a:extLst>
+          </p:cNvPr>
+          <p:cNvPicPr>
+            <a:picLocks noChangeAspect="1"/>
+          </p:cNvPicPr>
+          <p:nvPr/>
+        </p:nvPicPr>
+        <p:blipFill>
+          <a:blip r:embed="rId2"/>
+          <a:stretch>
+            <a:fillRect/>
+          </a:stretch>
+        </p:blipFill>
+        <p:spPr>
+          <a:xfrm>
+            <a:off x="10972800" y="5010451"/>
+            <a:ext cx="1281365" cy="1674767"/>
+          </a:xfrm>
+          <a:prstGeom prst="rect">
+            <a:avLst/>
+          </a:prstGeom>
+        </p:spPr>
+      </p:pic>
+      <p:pic>
+        <p:nvPicPr>
+          <p:cNvPr id="14" name="Picture 8" descr="Music festival Icon, Singing golden decoration, poster, summer, fruit png |  PNGWing">
+            <a:extLst>
+              <a:ext uri="{FF2B5EF4-FFF2-40B4-BE49-F238E27FC236}">
+                <a16:creationId xmlns:a16="http://schemas.microsoft.com/office/drawing/2014/main" id="{B53078FF-FA5B-D54E-8CC0-E2C71AD2CAA7}"/>
+              </a:ext>
+            </a:extLst>
+          </p:cNvPr>
+          <p:cNvPicPr>
+            <a:picLocks noChangeAspect="1" noChangeArrowheads="1"/>
+          </p:cNvPicPr>
+          <p:nvPr/>
+        </p:nvPicPr>
+        <p:blipFill>
+          <a:blip r:embed="rId3">
+            <a:extLst>
+              <a:ext uri="{BEBA8EAE-BF5A-486C-A8C5-ECC9F3942E4B}">
+                <a14:imgProps xmlns:a14="http://schemas.microsoft.com/office/drawing/2010/main">
+                  <a14:imgLayer r:embed="rId4">
+                    <a14:imgEffect>
+                      <a14:backgroundRemoval t="10000" b="90000" l="10000" r="90000"/>
+                    </a14:imgEffect>
+                  </a14:imgLayer>
+                </a14:imgProps>
+              </a:ext>
+              <a:ext uri="{28A0092B-C50C-407E-A947-70E740481C1C}">
+                <a14:useLocalDpi xmlns:a14="http://schemas.microsoft.com/office/drawing/2010/main" val="0"/>
+              </a:ext>
+            </a:extLst>
+          </a:blip>
+          <a:srcRect/>
+          <a:stretch>
+            <a:fillRect/>
+          </a:stretch>
+        </p:blipFill>
+        <p:spPr bwMode="auto">
+          <a:xfrm>
+            <a:off x="11081081" y="182998"/>
+            <a:ext cx="891263" cy="1133113"/>
+          </a:xfrm>
+          <a:prstGeom prst="rect">
+            <a:avLst/>
+          </a:prstGeom>
+          <a:noFill/>
+          <a:extLst>
+            <a:ext uri="{909E8E84-426E-40DD-AFC4-6F175D3DCCD1}">
+              <a14:hiddenFill xmlns:a14="http://schemas.microsoft.com/office/drawing/2010/main">
+                <a:solidFill>
+                  <a:srgbClr val="FFFFFF"/>
+                </a:solidFill>
+              </a14:hiddenFill>
+            </a:ext>
+          </a:extLst>
+        </p:spPr>
+      </p:pic>
+      <p:pic>
+        <p:nvPicPr>
+          <p:cNvPr id="15" name="Picture 4" descr="Tomato - Free food icons">
+            <a:extLst>
+              <a:ext uri="{FF2B5EF4-FFF2-40B4-BE49-F238E27FC236}">
+                <a16:creationId xmlns:a16="http://schemas.microsoft.com/office/drawing/2014/main" id="{00D1D9D5-244A-9D45-82B9-F8300EBA7A10}"/>
+              </a:ext>
+            </a:extLst>
+          </p:cNvPr>
+          <p:cNvPicPr>
+            <a:picLocks noChangeAspect="1" noChangeArrowheads="1"/>
+          </p:cNvPicPr>
+          <p:nvPr/>
+        </p:nvPicPr>
+        <p:blipFill>
+          <a:blip r:embed="rId5">
+            <a:extLst>
+              <a:ext uri="{28A0092B-C50C-407E-A947-70E740481C1C}">
+                <a14:useLocalDpi xmlns:a14="http://schemas.microsoft.com/office/drawing/2010/main" val="0"/>
+              </a:ext>
+            </a:extLst>
+          </a:blip>
+          <a:srcRect/>
+          <a:stretch>
+            <a:fillRect/>
+          </a:stretch>
+        </p:blipFill>
+        <p:spPr bwMode="auto">
+          <a:xfrm>
+            <a:off x="11300737" y="2933700"/>
+            <a:ext cx="671607" cy="671607"/>
+          </a:xfrm>
+          <a:prstGeom prst="rect">
+            <a:avLst/>
+          </a:prstGeom>
+          <a:noFill/>
+          <a:extLst>
+            <a:ext uri="{909E8E84-426E-40DD-AFC4-6F175D3DCCD1}">
+              <a14:hiddenFill xmlns:a14="http://schemas.microsoft.com/office/drawing/2010/main">
+                <a:solidFill>
+                  <a:srgbClr val="FFFFFF"/>
+                </a:solidFill>
+              </a14:hiddenFill>
+            </a:ext>
+          </a:extLst>
+        </p:spPr>
+      </p:pic>
+      <p:pic>
+        <p:nvPicPr>
+          <p:cNvPr id="16" name="Picture 6" descr="Mozzarella Di Bufala Icon On Transparent Background Stock Illustration -  Download Image Now - iStock">
+            <a:extLst>
+              <a:ext uri="{FF2B5EF4-FFF2-40B4-BE49-F238E27FC236}">
+                <a16:creationId xmlns:a16="http://schemas.microsoft.com/office/drawing/2014/main" id="{76BCD4CB-0035-1741-B2F8-600B920F880D}"/>
+              </a:ext>
+            </a:extLst>
+          </p:cNvPr>
+          <p:cNvPicPr>
+            <a:picLocks noChangeAspect="1" noChangeArrowheads="1"/>
+          </p:cNvPicPr>
+          <p:nvPr/>
+        </p:nvPicPr>
+        <p:blipFill>
+          <a:blip r:embed="rId6">
+            <a:extLst>
+              <a:ext uri="{28A0092B-C50C-407E-A947-70E740481C1C}">
+                <a14:useLocalDpi xmlns:a14="http://schemas.microsoft.com/office/drawing/2010/main" val="0"/>
+              </a:ext>
+            </a:extLst>
+          </a:blip>
+          <a:srcRect/>
+          <a:stretch>
+            <a:fillRect/>
+          </a:stretch>
+        </p:blipFill>
+        <p:spPr bwMode="auto">
+          <a:xfrm>
+            <a:off x="11275290" y="1789102"/>
+            <a:ext cx="671607" cy="671607"/>
+          </a:xfrm>
+          <a:prstGeom prst="rect">
+            <a:avLst/>
+          </a:prstGeom>
+          <a:noFill/>
+          <a:extLst>
+            <a:ext uri="{909E8E84-426E-40DD-AFC4-6F175D3DCCD1}">
+              <a14:hiddenFill xmlns:a14="http://schemas.microsoft.com/office/drawing/2010/main">
+                <a:solidFill>
+                  <a:srgbClr val="FFFFFF"/>
+                </a:solidFill>
+              </a14:hiddenFill>
+            </a:ext>
+          </a:extLst>
+        </p:spPr>
+      </p:pic>
+      <p:pic>
+        <p:nvPicPr>
+          <p:cNvPr id="17" name="Picture 14" descr="Herb Basil Icon | 3D Food Iconset | Icons-Land">
+            <a:extLst>
+              <a:ext uri="{FF2B5EF4-FFF2-40B4-BE49-F238E27FC236}">
+                <a16:creationId xmlns:a16="http://schemas.microsoft.com/office/drawing/2014/main" id="{69237BBB-ACD5-1846-8DE7-52288CD945C2}"/>
+              </a:ext>
+            </a:extLst>
+          </p:cNvPr>
+          <p:cNvPicPr>
+            <a:picLocks noChangeAspect="1" noChangeArrowheads="1"/>
+          </p:cNvPicPr>
+          <p:nvPr/>
+        </p:nvPicPr>
+        <p:blipFill>
+          <a:blip r:embed="rId7">
+            <a:extLst>
+              <a:ext uri="{28A0092B-C50C-407E-A947-70E740481C1C}">
+                <a14:useLocalDpi xmlns:a14="http://schemas.microsoft.com/office/drawing/2010/main" val="0"/>
+              </a:ext>
+            </a:extLst>
+          </a:blip>
+          <a:srcRect/>
+          <a:stretch>
+            <a:fillRect/>
+          </a:stretch>
+        </p:blipFill>
+        <p:spPr bwMode="auto">
+          <a:xfrm>
+            <a:off x="11300737" y="4186679"/>
+            <a:ext cx="620715" cy="620715"/>
+          </a:xfrm>
+          <a:prstGeom prst="rect">
+            <a:avLst/>
+          </a:prstGeom>
+          <a:noFill/>
+          <a:extLst>
+            <a:ext uri="{909E8E84-426E-40DD-AFC4-6F175D3DCCD1}">
+              <a14:hiddenFill xmlns:a14="http://schemas.microsoft.com/office/drawing/2010/main">
+                <a:solidFill>
+                  <a:srgbClr val="FFFFFF"/>
+                </a:solidFill>
+              </a14:hiddenFill>
+            </a:ext>
+          </a:extLst>
+        </p:spPr>
+      </p:pic>
+      <p:cxnSp>
+        <p:nvCxnSpPr>
+          <p:cNvPr id="29" name="Straight Connector 28">
+            <a:extLst>
+              <a:ext uri="{FF2B5EF4-FFF2-40B4-BE49-F238E27FC236}">
+                <a16:creationId xmlns:a16="http://schemas.microsoft.com/office/drawing/2014/main" id="{DB208D06-CCCC-7443-8C4E-9474A09B5624}"/>
+              </a:ext>
+            </a:extLst>
+          </p:cNvPr>
+          <p:cNvCxnSpPr>
+            <a:cxnSpLocks/>
+          </p:cNvCxnSpPr>
+          <p:nvPr/>
+        </p:nvCxnSpPr>
+        <p:spPr>
+          <a:xfrm>
+            <a:off x="10972800" y="0"/>
+            <a:ext cx="0" cy="6858000"/>
+          </a:xfrm>
+          <a:prstGeom prst="line">
+            <a:avLst/>
+          </a:prstGeom>
+          <a:ln w="38100">
+            <a:solidFill>
+              <a:srgbClr val="FF0000"/>
+            </a:solidFill>
+          </a:ln>
+          <a:effectLst>
+            <a:glow rad="101600">
+              <a:schemeClr val="accent2">
+                <a:satMod val="175000"/>
+                <a:alpha val="40000"/>
+              </a:schemeClr>
+            </a:glow>
+          </a:effectLst>
+        </p:spPr>
+        <p:style>
+          <a:lnRef idx="1">
+            <a:schemeClr val="accent1"/>
+          </a:lnRef>
+          <a:fillRef idx="0">
+            <a:schemeClr val="accent1"/>
+          </a:fillRef>
+          <a:effectRef idx="0">
+            <a:schemeClr val="accent1"/>
+          </a:effectRef>
+          <a:fontRef idx="minor">
+            <a:schemeClr val="tx1"/>
+          </a:fontRef>
+        </p:style>
+      </p:cxnSp>
+      <p:sp>
+        <p:nvSpPr>
+          <p:cNvPr id="23" name="Subtitle 2">
+            <a:extLst>
+              <a:ext uri="{FF2B5EF4-FFF2-40B4-BE49-F238E27FC236}">
+                <a16:creationId xmlns:a16="http://schemas.microsoft.com/office/drawing/2014/main" id="{45CD0F5E-7482-7E48-A530-D5E008885DBA}"/>
+              </a:ext>
+            </a:extLst>
+          </p:cNvPr>
+          <p:cNvSpPr>
+            <a:spLocks noGrp="1"/>
+          </p:cNvSpPr>
+          <p:nvPr>
+            <p:ph type="subTitle" idx="1"/>
+          </p:nvPr>
+        </p:nvSpPr>
+        <p:spPr>
+          <a:xfrm>
+            <a:off x="1500864" y="1728016"/>
+            <a:ext cx="9144000" cy="4119533"/>
+          </a:xfrm>
+        </p:spPr>
+        <p:txBody>
+          <a:bodyPr>
+            <a:normAutofit/>
+          </a:bodyPr>
+          <a:lstStyle/>
+          <a:p>
+            <a:r>
+              <a:rPr lang="en-US" dirty="0"/>
+              <a:t>More time spent </a:t>
+            </a:r>
+          </a:p>
+          <a:p>
+            <a:r>
+              <a:rPr lang="en-US" dirty="0"/>
+              <a:t>on designing the classes / OOP</a:t>
+            </a:r>
+          </a:p>
+          <a:p>
+            <a:endParaRPr lang="en-US" dirty="0"/>
+          </a:p>
+          <a:p>
+            <a:r>
+              <a:rPr lang="en-US" dirty="0"/>
+              <a:t>More time spent on understanding how to acquire, </a:t>
+            </a:r>
+          </a:p>
+          <a:p>
+            <a:r>
+              <a:rPr lang="en-US" dirty="0"/>
+              <a:t>modify and manage the AV assets</a:t>
+            </a:r>
+          </a:p>
+        </p:txBody>
+      </p:sp>
+    </p:spTree>
+    <p:extLst>
+      <p:ext uri="{BB962C8B-B14F-4D97-AF65-F5344CB8AC3E}">
+        <p14:creationId xmlns:p14="http://schemas.microsoft.com/office/powerpoint/2010/main" val="2683299025"/>
+      </p:ext>
+    </p:extLst>
+  </p:cSld>
+  <p:clrMapOvr>
+    <a:masterClrMapping/>
+  </p:clrMapOvr>
+</p:sld>
+</file>
+
 <file path=ppt/theme/theme1.xml><?xml version="1.0" encoding="utf-8"?>
 <a:theme xmlns:a="http://schemas.openxmlformats.org/drawingml/2006/main" name="Office Theme">
   <a:themeElements>

</xml_diff>